<commit_message>
fix costs and redoc brief
</commit_message>
<xml_diff>
--- a/brief.pptx
+++ b/brief.pptx
@@ -1,6 +1,6 @@
 
 <file path=ppt/presentation.xml><?xml version="1.0" encoding="utf-8"?>
-<p:presentation xmlns:a="http://schemas.openxmlformats.org/drawingml/2006/main" xmlns:p="http://schemas.openxmlformats.org/presentationml/2006/main" xmlns:r="http://schemas.openxmlformats.org/officeDocument/2006/relationships">
+<p:presentation xmlns:a="http://schemas.openxmlformats.org/drawingml/2006/main" xmlns:p="http://schemas.openxmlformats.org/presentationml/2006/main" xmlns:r="http://schemas.openxmlformats.org/officeDocument/2006/relationships" xmlns:p14="http://schemas.microsoft.com/office/powerpoint/2010/main" xmlns:p15="http://schemas.microsoft.com/office/powerpoint/2012/main" xmlns:mc="http://schemas.openxmlformats.org/markup-compatibility/2006">
   <p:sldMasterIdLst>
     <p:sldMasterId id="2147483648" r:id="rId2"/>
   </p:sldMasterIdLst>
@@ -14,7 +14,7 @@
 </file>
 
 <file path=ppt/slideLayouts/slideLayout1.xml><?xml version="1.0" encoding="utf-8"?>
-<p:sldLayout xmlns:a="http://schemas.openxmlformats.org/drawingml/2006/main" xmlns:p="http://schemas.openxmlformats.org/presentationml/2006/main" xmlns:r="http://schemas.openxmlformats.org/officeDocument/2006/relationships" type="blank" preserve="1">
+<p:sldLayout xmlns:a="http://schemas.openxmlformats.org/drawingml/2006/main" xmlns:p="http://schemas.openxmlformats.org/presentationml/2006/main" xmlns:r="http://schemas.openxmlformats.org/officeDocument/2006/relationships" xmlns:p14="http://schemas.microsoft.com/office/powerpoint/2010/main" xmlns:p15="http://schemas.microsoft.com/office/powerpoint/2012/main" xmlns:mc="http://schemas.openxmlformats.org/markup-compatibility/2006" type="blank" preserve="1">
   <p:cSld name="Blank Slide">
     <p:spTree>
       <p:nvGrpSpPr>
@@ -36,7 +36,7 @@
 </file>
 
 <file path=ppt/slideLayouts/slideLayout10.xml><?xml version="1.0" encoding="utf-8"?>
-<p:sldLayout xmlns:a="http://schemas.openxmlformats.org/drawingml/2006/main" xmlns:p="http://schemas.openxmlformats.org/presentationml/2006/main" xmlns:r="http://schemas.openxmlformats.org/officeDocument/2006/relationships" type="objOverTx" preserve="1">
+<p:sldLayout xmlns:a="http://schemas.openxmlformats.org/drawingml/2006/main" xmlns:p="http://schemas.openxmlformats.org/presentationml/2006/main" xmlns:r="http://schemas.openxmlformats.org/officeDocument/2006/relationships" xmlns:p14="http://schemas.microsoft.com/office/powerpoint/2010/main" xmlns:p15="http://schemas.microsoft.com/office/powerpoint/2012/main" xmlns:mc="http://schemas.openxmlformats.org/markup-compatibility/2006" type="objOverTx" preserve="1">
   <p:cSld name="Title, Content over Content">
     <p:spTree>
       <p:nvGrpSpPr>
@@ -75,7 +75,17 @@
           <a:bodyPr lIns="0" rIns="0" tIns="0" bIns="0" anchor="ctr"/>
           <a:p>
             <a:pPr algn="ctr"/>
-            <a:endParaRPr/>
+            <a:endParaRPr b="0" lang="en-US" sz="4400" spc="-1" strike="noStrike">
+              <a:solidFill>
+                <a:srgbClr val="000000"/>
+              </a:solidFill>
+              <a:uFill>
+                <a:solidFill>
+                  <a:srgbClr val="ffffff"/>
+                </a:solidFill>
+              </a:uFill>
+              <a:latin typeface="Arial"/>
+            </a:endParaRPr>
           </a:p>
         </p:txBody>
       </p:sp>
@@ -99,9 +109,21 @@
           </a:prstGeom>
         </p:spPr>
         <p:txBody>
-          <a:bodyPr lIns="0" rIns="0" tIns="0" bIns="0"/>
-          <a:p>
-            <a:endParaRPr/>
+          <a:bodyPr lIns="0" rIns="0" tIns="0" bIns="0">
+            <a:normAutofit/>
+          </a:bodyPr>
+          <a:p>
+            <a:endParaRPr b="0" lang="en-US" sz="3200" spc="-1" strike="noStrike">
+              <a:solidFill>
+                <a:srgbClr val="000000"/>
+              </a:solidFill>
+              <a:uFill>
+                <a:solidFill>
+                  <a:srgbClr val="ffffff"/>
+                </a:solidFill>
+              </a:uFill>
+              <a:latin typeface="Arial"/>
+            </a:endParaRPr>
           </a:p>
         </p:txBody>
       </p:sp>
@@ -125,9 +147,21 @@
           </a:prstGeom>
         </p:spPr>
         <p:txBody>
-          <a:bodyPr lIns="0" rIns="0" tIns="0" bIns="0"/>
-          <a:p>
-            <a:endParaRPr/>
+          <a:bodyPr lIns="0" rIns="0" tIns="0" bIns="0">
+            <a:normAutofit/>
+          </a:bodyPr>
+          <a:p>
+            <a:endParaRPr b="0" lang="en-US" sz="3200" spc="-1" strike="noStrike">
+              <a:solidFill>
+                <a:srgbClr val="000000"/>
+              </a:solidFill>
+              <a:uFill>
+                <a:solidFill>
+                  <a:srgbClr val="ffffff"/>
+                </a:solidFill>
+              </a:uFill>
+              <a:latin typeface="Arial"/>
+            </a:endParaRPr>
           </a:p>
         </p:txBody>
       </p:sp>
@@ -137,7 +171,7 @@
 </file>
 
 <file path=ppt/slideLayouts/slideLayout11.xml><?xml version="1.0" encoding="utf-8"?>
-<p:sldLayout xmlns:a="http://schemas.openxmlformats.org/drawingml/2006/main" xmlns:p="http://schemas.openxmlformats.org/presentationml/2006/main" xmlns:r="http://schemas.openxmlformats.org/officeDocument/2006/relationships" type="fourObj" preserve="1">
+<p:sldLayout xmlns:a="http://schemas.openxmlformats.org/drawingml/2006/main" xmlns:p="http://schemas.openxmlformats.org/presentationml/2006/main" xmlns:r="http://schemas.openxmlformats.org/officeDocument/2006/relationships" xmlns:p14="http://schemas.microsoft.com/office/powerpoint/2010/main" xmlns:p15="http://schemas.microsoft.com/office/powerpoint/2012/main" xmlns:mc="http://schemas.openxmlformats.org/markup-compatibility/2006" type="fourObj" preserve="1">
   <p:cSld name="Title, 4 Content">
     <p:spTree>
       <p:nvGrpSpPr>
@@ -176,7 +210,17 @@
           <a:bodyPr lIns="0" rIns="0" tIns="0" bIns="0" anchor="ctr"/>
           <a:p>
             <a:pPr algn="ctr"/>
-            <a:endParaRPr/>
+            <a:endParaRPr b="0" lang="en-US" sz="4400" spc="-1" strike="noStrike">
+              <a:solidFill>
+                <a:srgbClr val="000000"/>
+              </a:solidFill>
+              <a:uFill>
+                <a:solidFill>
+                  <a:srgbClr val="ffffff"/>
+                </a:solidFill>
+              </a:uFill>
+              <a:latin typeface="Arial"/>
+            </a:endParaRPr>
           </a:p>
         </p:txBody>
       </p:sp>
@@ -200,9 +244,21 @@
           </a:prstGeom>
         </p:spPr>
         <p:txBody>
-          <a:bodyPr lIns="0" rIns="0" tIns="0" bIns="0"/>
-          <a:p>
-            <a:endParaRPr/>
+          <a:bodyPr lIns="0" rIns="0" tIns="0" bIns="0">
+            <a:normAutofit/>
+          </a:bodyPr>
+          <a:p>
+            <a:endParaRPr b="0" lang="en-US" sz="3200" spc="-1" strike="noStrike">
+              <a:solidFill>
+                <a:srgbClr val="000000"/>
+              </a:solidFill>
+              <a:uFill>
+                <a:solidFill>
+                  <a:srgbClr val="ffffff"/>
+                </a:solidFill>
+              </a:uFill>
+              <a:latin typeface="Arial"/>
+            </a:endParaRPr>
           </a:p>
         </p:txBody>
       </p:sp>
@@ -226,9 +282,21 @@
           </a:prstGeom>
         </p:spPr>
         <p:txBody>
-          <a:bodyPr lIns="0" rIns="0" tIns="0" bIns="0"/>
-          <a:p>
-            <a:endParaRPr/>
+          <a:bodyPr lIns="0" rIns="0" tIns="0" bIns="0">
+            <a:normAutofit/>
+          </a:bodyPr>
+          <a:p>
+            <a:endParaRPr b="0" lang="en-US" sz="3200" spc="-1" strike="noStrike">
+              <a:solidFill>
+                <a:srgbClr val="000000"/>
+              </a:solidFill>
+              <a:uFill>
+                <a:solidFill>
+                  <a:srgbClr val="ffffff"/>
+                </a:solidFill>
+              </a:uFill>
+              <a:latin typeface="Arial"/>
+            </a:endParaRPr>
           </a:p>
         </p:txBody>
       </p:sp>
@@ -252,9 +320,21 @@
           </a:prstGeom>
         </p:spPr>
         <p:txBody>
-          <a:bodyPr lIns="0" rIns="0" tIns="0" bIns="0"/>
-          <a:p>
-            <a:endParaRPr/>
+          <a:bodyPr lIns="0" rIns="0" tIns="0" bIns="0">
+            <a:normAutofit/>
+          </a:bodyPr>
+          <a:p>
+            <a:endParaRPr b="0" lang="en-US" sz="3200" spc="-1" strike="noStrike">
+              <a:solidFill>
+                <a:srgbClr val="000000"/>
+              </a:solidFill>
+              <a:uFill>
+                <a:solidFill>
+                  <a:srgbClr val="ffffff"/>
+                </a:solidFill>
+              </a:uFill>
+              <a:latin typeface="Arial"/>
+            </a:endParaRPr>
           </a:p>
         </p:txBody>
       </p:sp>
@@ -278,9 +358,21 @@
           </a:prstGeom>
         </p:spPr>
         <p:txBody>
-          <a:bodyPr lIns="0" rIns="0" tIns="0" bIns="0"/>
-          <a:p>
-            <a:endParaRPr/>
+          <a:bodyPr lIns="0" rIns="0" tIns="0" bIns="0">
+            <a:normAutofit/>
+          </a:bodyPr>
+          <a:p>
+            <a:endParaRPr b="0" lang="en-US" sz="3200" spc="-1" strike="noStrike">
+              <a:solidFill>
+                <a:srgbClr val="000000"/>
+              </a:solidFill>
+              <a:uFill>
+                <a:solidFill>
+                  <a:srgbClr val="ffffff"/>
+                </a:solidFill>
+              </a:uFill>
+              <a:latin typeface="Arial"/>
+            </a:endParaRPr>
           </a:p>
         </p:txBody>
       </p:sp>
@@ -290,7 +382,7 @@
 </file>
 
 <file path=ppt/slideLayouts/slideLayout12.xml><?xml version="1.0" encoding="utf-8"?>
-<p:sldLayout xmlns:a="http://schemas.openxmlformats.org/drawingml/2006/main" xmlns:p="http://schemas.openxmlformats.org/presentationml/2006/main" xmlns:r="http://schemas.openxmlformats.org/officeDocument/2006/relationships" type="blank" preserve="1">
+<p:sldLayout xmlns:a="http://schemas.openxmlformats.org/drawingml/2006/main" xmlns:p="http://schemas.openxmlformats.org/presentationml/2006/main" xmlns:r="http://schemas.openxmlformats.org/officeDocument/2006/relationships" xmlns:p14="http://schemas.microsoft.com/office/powerpoint/2010/main" xmlns:p15="http://schemas.microsoft.com/office/powerpoint/2012/main" xmlns:mc="http://schemas.openxmlformats.org/markup-compatibility/2006" type="blank" preserve="1">
   <p:cSld name="Title, 6 Content">
     <p:spTree>
       <p:nvGrpSpPr>
@@ -329,7 +421,17 @@
           <a:bodyPr lIns="0" rIns="0" tIns="0" bIns="0" anchor="ctr"/>
           <a:p>
             <a:pPr algn="ctr"/>
-            <a:endParaRPr/>
+            <a:endParaRPr b="0" lang="en-US" sz="4400" spc="-1" strike="noStrike">
+              <a:solidFill>
+                <a:srgbClr val="000000"/>
+              </a:solidFill>
+              <a:uFill>
+                <a:solidFill>
+                  <a:srgbClr val="ffffff"/>
+                </a:solidFill>
+              </a:uFill>
+              <a:latin typeface="Arial"/>
+            </a:endParaRPr>
           </a:p>
         </p:txBody>
       </p:sp>
@@ -346,16 +448,28 @@
         <p:spPr>
           <a:xfrm>
             <a:off x="504000" y="1768680"/>
-            <a:ext cx="9072000" cy="4384080"/>
-          </a:xfrm>
-          <a:prstGeom prst="rect">
-            <a:avLst/>
-          </a:prstGeom>
-        </p:spPr>
-        <p:txBody>
-          <a:bodyPr lIns="0" rIns="0" tIns="0" bIns="0"/>
-          <a:p>
-            <a:endParaRPr/>
+            <a:ext cx="2921040" cy="2090880"/>
+          </a:xfrm>
+          <a:prstGeom prst="rect">
+            <a:avLst/>
+          </a:prstGeom>
+        </p:spPr>
+        <p:txBody>
+          <a:bodyPr lIns="0" rIns="0" tIns="0" bIns="0">
+            <a:normAutofit/>
+          </a:bodyPr>
+          <a:p>
+            <a:endParaRPr b="0" lang="en-US" sz="3200" spc="-1" strike="noStrike">
+              <a:solidFill>
+                <a:srgbClr val="000000"/>
+              </a:solidFill>
+              <a:uFill>
+                <a:solidFill>
+                  <a:srgbClr val="ffffff"/>
+                </a:solidFill>
+              </a:uFill>
+              <a:latin typeface="Arial"/>
+            </a:endParaRPr>
           </a:p>
         </p:txBody>
       </p:sp>
@@ -371,73 +485,191 @@
         </p:nvSpPr>
         <p:spPr>
           <a:xfrm>
-            <a:off x="504000" y="1768680"/>
-            <a:ext cx="9072000" cy="4384080"/>
-          </a:xfrm>
-          <a:prstGeom prst="rect">
-            <a:avLst/>
-          </a:prstGeom>
-        </p:spPr>
-        <p:txBody>
-          <a:bodyPr lIns="0" rIns="0" tIns="0" bIns="0"/>
-          <a:p>
-            <a:endParaRPr/>
-          </a:p>
-        </p:txBody>
-      </p:sp>
-      <p:pic>
-        <p:nvPicPr>
-          <p:cNvPr id="34" name="" descr=""/>
-          <p:cNvPicPr/>
-          <p:nvPr/>
-        </p:nvPicPr>
-        <p:blipFill>
-          <a:blip r:embed="rId2"/>
-          <a:stretch/>
-        </p:blipFill>
-        <p:spPr>
-          <a:xfrm>
-            <a:off x="2292480" y="1768680"/>
-            <a:ext cx="5494680" cy="4384080"/>
-          </a:xfrm>
-          <a:prstGeom prst="rect">
-            <a:avLst/>
-          </a:prstGeom>
-          <a:ln>
-            <a:noFill/>
-          </a:ln>
-        </p:spPr>
-      </p:pic>
-      <p:pic>
-        <p:nvPicPr>
-          <p:cNvPr id="35" name="" descr=""/>
-          <p:cNvPicPr/>
-          <p:nvPr/>
-        </p:nvPicPr>
-        <p:blipFill>
-          <a:blip r:embed="rId3"/>
-          <a:stretch/>
-        </p:blipFill>
-        <p:spPr>
-          <a:xfrm>
-            <a:off x="2292480" y="1768680"/>
-            <a:ext cx="5494680" cy="4384080"/>
-          </a:xfrm>
-          <a:prstGeom prst="rect">
-            <a:avLst/>
-          </a:prstGeom>
-          <a:ln>
-            <a:noFill/>
-          </a:ln>
-        </p:spPr>
-      </p:pic>
+            <a:off x="3571560" y="1768680"/>
+            <a:ext cx="2921040" cy="2090880"/>
+          </a:xfrm>
+          <a:prstGeom prst="rect">
+            <a:avLst/>
+          </a:prstGeom>
+        </p:spPr>
+        <p:txBody>
+          <a:bodyPr lIns="0" rIns="0" tIns="0" bIns="0">
+            <a:normAutofit/>
+          </a:bodyPr>
+          <a:p>
+            <a:endParaRPr b="0" lang="en-US" sz="3200" spc="-1" strike="noStrike">
+              <a:solidFill>
+                <a:srgbClr val="000000"/>
+              </a:solidFill>
+              <a:uFill>
+                <a:solidFill>
+                  <a:srgbClr val="ffffff"/>
+                </a:solidFill>
+              </a:uFill>
+              <a:latin typeface="Arial"/>
+            </a:endParaRPr>
+          </a:p>
+        </p:txBody>
+      </p:sp>
+      <p:sp>
+        <p:nvSpPr>
+          <p:cNvPr id="34" name="PlaceHolder 4"/>
+          <p:cNvSpPr>
+            <a:spLocks noGrp="1"/>
+          </p:cNvSpPr>
+          <p:nvPr>
+            <p:ph type="body"/>
+          </p:nvPr>
+        </p:nvSpPr>
+        <p:spPr>
+          <a:xfrm>
+            <a:off x="6639120" y="1768680"/>
+            <a:ext cx="2921040" cy="2090880"/>
+          </a:xfrm>
+          <a:prstGeom prst="rect">
+            <a:avLst/>
+          </a:prstGeom>
+        </p:spPr>
+        <p:txBody>
+          <a:bodyPr lIns="0" rIns="0" tIns="0" bIns="0">
+            <a:normAutofit/>
+          </a:bodyPr>
+          <a:p>
+            <a:endParaRPr b="0" lang="en-US" sz="3200" spc="-1" strike="noStrike">
+              <a:solidFill>
+                <a:srgbClr val="000000"/>
+              </a:solidFill>
+              <a:uFill>
+                <a:solidFill>
+                  <a:srgbClr val="ffffff"/>
+                </a:solidFill>
+              </a:uFill>
+              <a:latin typeface="Arial"/>
+            </a:endParaRPr>
+          </a:p>
+        </p:txBody>
+      </p:sp>
+      <p:sp>
+        <p:nvSpPr>
+          <p:cNvPr id="35" name="PlaceHolder 5"/>
+          <p:cNvSpPr>
+            <a:spLocks noGrp="1"/>
+          </p:cNvSpPr>
+          <p:nvPr>
+            <p:ph type="body"/>
+          </p:nvPr>
+        </p:nvSpPr>
+        <p:spPr>
+          <a:xfrm>
+            <a:off x="6639120" y="4058640"/>
+            <a:ext cx="2921040" cy="2090880"/>
+          </a:xfrm>
+          <a:prstGeom prst="rect">
+            <a:avLst/>
+          </a:prstGeom>
+        </p:spPr>
+        <p:txBody>
+          <a:bodyPr lIns="0" rIns="0" tIns="0" bIns="0">
+            <a:normAutofit/>
+          </a:bodyPr>
+          <a:p>
+            <a:endParaRPr b="0" lang="en-US" sz="3200" spc="-1" strike="noStrike">
+              <a:solidFill>
+                <a:srgbClr val="000000"/>
+              </a:solidFill>
+              <a:uFill>
+                <a:solidFill>
+                  <a:srgbClr val="ffffff"/>
+                </a:solidFill>
+              </a:uFill>
+              <a:latin typeface="Arial"/>
+            </a:endParaRPr>
+          </a:p>
+        </p:txBody>
+      </p:sp>
+      <p:sp>
+        <p:nvSpPr>
+          <p:cNvPr id="36" name="PlaceHolder 6"/>
+          <p:cNvSpPr>
+            <a:spLocks noGrp="1"/>
+          </p:cNvSpPr>
+          <p:nvPr>
+            <p:ph type="body"/>
+          </p:nvPr>
+        </p:nvSpPr>
+        <p:spPr>
+          <a:xfrm>
+            <a:off x="3571560" y="4058640"/>
+            <a:ext cx="2921040" cy="2090880"/>
+          </a:xfrm>
+          <a:prstGeom prst="rect">
+            <a:avLst/>
+          </a:prstGeom>
+        </p:spPr>
+        <p:txBody>
+          <a:bodyPr lIns="0" rIns="0" tIns="0" bIns="0">
+            <a:normAutofit/>
+          </a:bodyPr>
+          <a:p>
+            <a:endParaRPr b="0" lang="en-US" sz="3200" spc="-1" strike="noStrike">
+              <a:solidFill>
+                <a:srgbClr val="000000"/>
+              </a:solidFill>
+              <a:uFill>
+                <a:solidFill>
+                  <a:srgbClr val="ffffff"/>
+                </a:solidFill>
+              </a:uFill>
+              <a:latin typeface="Arial"/>
+            </a:endParaRPr>
+          </a:p>
+        </p:txBody>
+      </p:sp>
+      <p:sp>
+        <p:nvSpPr>
+          <p:cNvPr id="37" name="PlaceHolder 7"/>
+          <p:cNvSpPr>
+            <a:spLocks noGrp="1"/>
+          </p:cNvSpPr>
+          <p:nvPr>
+            <p:ph type="body"/>
+          </p:nvPr>
+        </p:nvSpPr>
+        <p:spPr>
+          <a:xfrm>
+            <a:off x="504000" y="4058640"/>
+            <a:ext cx="2921040" cy="2090880"/>
+          </a:xfrm>
+          <a:prstGeom prst="rect">
+            <a:avLst/>
+          </a:prstGeom>
+        </p:spPr>
+        <p:txBody>
+          <a:bodyPr lIns="0" rIns="0" tIns="0" bIns="0">
+            <a:normAutofit/>
+          </a:bodyPr>
+          <a:p>
+            <a:endParaRPr b="0" lang="en-US" sz="3200" spc="-1" strike="noStrike">
+              <a:solidFill>
+                <a:srgbClr val="000000"/>
+              </a:solidFill>
+              <a:uFill>
+                <a:solidFill>
+                  <a:srgbClr val="ffffff"/>
+                </a:solidFill>
+              </a:uFill>
+              <a:latin typeface="Arial"/>
+            </a:endParaRPr>
+          </a:p>
+        </p:txBody>
+      </p:sp>
     </p:spTree>
   </p:cSld>
 </p:sldLayout>
 </file>
 
 <file path=ppt/slideLayouts/slideLayout2.xml><?xml version="1.0" encoding="utf-8"?>
-<p:sldLayout xmlns:a="http://schemas.openxmlformats.org/drawingml/2006/main" xmlns:p="http://schemas.openxmlformats.org/presentationml/2006/main" xmlns:r="http://schemas.openxmlformats.org/officeDocument/2006/relationships" type="tx" preserve="1">
+<p:sldLayout xmlns:a="http://schemas.openxmlformats.org/drawingml/2006/main" xmlns:p="http://schemas.openxmlformats.org/presentationml/2006/main" xmlns:r="http://schemas.openxmlformats.org/officeDocument/2006/relationships" xmlns:p14="http://schemas.microsoft.com/office/powerpoint/2010/main" xmlns:p15="http://schemas.microsoft.com/office/powerpoint/2012/main" xmlns:mc="http://schemas.openxmlformats.org/markup-compatibility/2006" type="tx" preserve="1">
   <p:cSld name="Title Slide">
     <p:spTree>
       <p:nvGrpSpPr>
@@ -476,7 +708,17 @@
           <a:bodyPr lIns="0" rIns="0" tIns="0" bIns="0" anchor="ctr"/>
           <a:p>
             <a:pPr algn="ctr"/>
-            <a:endParaRPr/>
+            <a:endParaRPr b="0" lang="en-US" sz="4400" spc="-1" strike="noStrike">
+              <a:solidFill>
+                <a:srgbClr val="000000"/>
+              </a:solidFill>
+              <a:uFill>
+                <a:solidFill>
+                  <a:srgbClr val="ffffff"/>
+                </a:solidFill>
+              </a:uFill>
+              <a:latin typeface="Arial"/>
+            </a:endParaRPr>
           </a:p>
         </p:txBody>
       </p:sp>
@@ -503,7 +745,17 @@
           <a:bodyPr lIns="0" rIns="0" tIns="0" bIns="0" anchor="ctr"/>
           <a:p>
             <a:pPr algn="ctr"/>
-            <a:endParaRPr/>
+            <a:endParaRPr b="0" lang="en-US" sz="3200" spc="-1" strike="noStrike">
+              <a:solidFill>
+                <a:srgbClr val="000000"/>
+              </a:solidFill>
+              <a:uFill>
+                <a:solidFill>
+                  <a:srgbClr val="ffffff"/>
+                </a:solidFill>
+              </a:uFill>
+              <a:latin typeface="Arial"/>
+            </a:endParaRPr>
           </a:p>
         </p:txBody>
       </p:sp>
@@ -513,7 +765,7 @@
 </file>
 
 <file path=ppt/slideLayouts/slideLayout3.xml><?xml version="1.0" encoding="utf-8"?>
-<p:sldLayout xmlns:a="http://schemas.openxmlformats.org/drawingml/2006/main" xmlns:p="http://schemas.openxmlformats.org/presentationml/2006/main" xmlns:r="http://schemas.openxmlformats.org/officeDocument/2006/relationships" type="obj" preserve="1">
+<p:sldLayout xmlns:a="http://schemas.openxmlformats.org/drawingml/2006/main" xmlns:p="http://schemas.openxmlformats.org/presentationml/2006/main" xmlns:r="http://schemas.openxmlformats.org/officeDocument/2006/relationships" xmlns:p14="http://schemas.microsoft.com/office/powerpoint/2010/main" xmlns:p15="http://schemas.microsoft.com/office/powerpoint/2012/main" xmlns:mc="http://schemas.openxmlformats.org/markup-compatibility/2006" type="obj" preserve="1">
   <p:cSld name="Title, Content">
     <p:spTree>
       <p:nvGrpSpPr>
@@ -552,7 +804,17 @@
           <a:bodyPr lIns="0" rIns="0" tIns="0" bIns="0" anchor="ctr"/>
           <a:p>
             <a:pPr algn="ctr"/>
-            <a:endParaRPr/>
+            <a:endParaRPr b="0" lang="en-US" sz="4400" spc="-1" strike="noStrike">
+              <a:solidFill>
+                <a:srgbClr val="000000"/>
+              </a:solidFill>
+              <a:uFill>
+                <a:solidFill>
+                  <a:srgbClr val="ffffff"/>
+                </a:solidFill>
+              </a:uFill>
+              <a:latin typeface="Arial"/>
+            </a:endParaRPr>
           </a:p>
         </p:txBody>
       </p:sp>
@@ -576,9 +838,21 @@
           </a:prstGeom>
         </p:spPr>
         <p:txBody>
-          <a:bodyPr lIns="0" rIns="0" tIns="0" bIns="0"/>
-          <a:p>
-            <a:endParaRPr/>
+          <a:bodyPr lIns="0" rIns="0" tIns="0" bIns="0">
+            <a:normAutofit/>
+          </a:bodyPr>
+          <a:p>
+            <a:endParaRPr b="0" lang="en-US" sz="3200" spc="-1" strike="noStrike">
+              <a:solidFill>
+                <a:srgbClr val="000000"/>
+              </a:solidFill>
+              <a:uFill>
+                <a:solidFill>
+                  <a:srgbClr val="ffffff"/>
+                </a:solidFill>
+              </a:uFill>
+              <a:latin typeface="Arial"/>
+            </a:endParaRPr>
           </a:p>
         </p:txBody>
       </p:sp>
@@ -588,7 +862,7 @@
 </file>
 
 <file path=ppt/slideLayouts/slideLayout4.xml><?xml version="1.0" encoding="utf-8"?>
-<p:sldLayout xmlns:a="http://schemas.openxmlformats.org/drawingml/2006/main" xmlns:p="http://schemas.openxmlformats.org/presentationml/2006/main" xmlns:r="http://schemas.openxmlformats.org/officeDocument/2006/relationships" type="twoObj" preserve="1">
+<p:sldLayout xmlns:a="http://schemas.openxmlformats.org/drawingml/2006/main" xmlns:p="http://schemas.openxmlformats.org/presentationml/2006/main" xmlns:r="http://schemas.openxmlformats.org/officeDocument/2006/relationships" xmlns:p14="http://schemas.microsoft.com/office/powerpoint/2010/main" xmlns:p15="http://schemas.microsoft.com/office/powerpoint/2012/main" xmlns:mc="http://schemas.openxmlformats.org/markup-compatibility/2006" type="twoObj" preserve="1">
   <p:cSld name="Title, 2 Content">
     <p:spTree>
       <p:nvGrpSpPr>
@@ -627,7 +901,17 @@
           <a:bodyPr lIns="0" rIns="0" tIns="0" bIns="0" anchor="ctr"/>
           <a:p>
             <a:pPr algn="ctr"/>
-            <a:endParaRPr/>
+            <a:endParaRPr b="0" lang="en-US" sz="4400" spc="-1" strike="noStrike">
+              <a:solidFill>
+                <a:srgbClr val="000000"/>
+              </a:solidFill>
+              <a:uFill>
+                <a:solidFill>
+                  <a:srgbClr val="ffffff"/>
+                </a:solidFill>
+              </a:uFill>
+              <a:latin typeface="Arial"/>
+            </a:endParaRPr>
           </a:p>
         </p:txBody>
       </p:sp>
@@ -651,9 +935,21 @@
           </a:prstGeom>
         </p:spPr>
         <p:txBody>
-          <a:bodyPr lIns="0" rIns="0" tIns="0" bIns="0"/>
-          <a:p>
-            <a:endParaRPr/>
+          <a:bodyPr lIns="0" rIns="0" tIns="0" bIns="0">
+            <a:normAutofit/>
+          </a:bodyPr>
+          <a:p>
+            <a:endParaRPr b="0" lang="en-US" sz="3200" spc="-1" strike="noStrike">
+              <a:solidFill>
+                <a:srgbClr val="000000"/>
+              </a:solidFill>
+              <a:uFill>
+                <a:solidFill>
+                  <a:srgbClr val="ffffff"/>
+                </a:solidFill>
+              </a:uFill>
+              <a:latin typeface="Arial"/>
+            </a:endParaRPr>
           </a:p>
         </p:txBody>
       </p:sp>
@@ -677,9 +973,21 @@
           </a:prstGeom>
         </p:spPr>
         <p:txBody>
-          <a:bodyPr lIns="0" rIns="0" tIns="0" bIns="0"/>
-          <a:p>
-            <a:endParaRPr/>
+          <a:bodyPr lIns="0" rIns="0" tIns="0" bIns="0">
+            <a:normAutofit/>
+          </a:bodyPr>
+          <a:p>
+            <a:endParaRPr b="0" lang="en-US" sz="3200" spc="-1" strike="noStrike">
+              <a:solidFill>
+                <a:srgbClr val="000000"/>
+              </a:solidFill>
+              <a:uFill>
+                <a:solidFill>
+                  <a:srgbClr val="ffffff"/>
+                </a:solidFill>
+              </a:uFill>
+              <a:latin typeface="Arial"/>
+            </a:endParaRPr>
           </a:p>
         </p:txBody>
       </p:sp>
@@ -689,7 +997,7 @@
 </file>
 
 <file path=ppt/slideLayouts/slideLayout5.xml><?xml version="1.0" encoding="utf-8"?>
-<p:sldLayout xmlns:a="http://schemas.openxmlformats.org/drawingml/2006/main" xmlns:p="http://schemas.openxmlformats.org/presentationml/2006/main" xmlns:r="http://schemas.openxmlformats.org/officeDocument/2006/relationships" type="titleOnly" preserve="1">
+<p:sldLayout xmlns:a="http://schemas.openxmlformats.org/drawingml/2006/main" xmlns:p="http://schemas.openxmlformats.org/presentationml/2006/main" xmlns:r="http://schemas.openxmlformats.org/officeDocument/2006/relationships" xmlns:p14="http://schemas.microsoft.com/office/powerpoint/2010/main" xmlns:p15="http://schemas.microsoft.com/office/powerpoint/2012/main" xmlns:mc="http://schemas.openxmlformats.org/markup-compatibility/2006" type="titleOnly" preserve="1">
   <p:cSld name="Title Only">
     <p:spTree>
       <p:nvGrpSpPr>
@@ -728,7 +1036,17 @@
           <a:bodyPr lIns="0" rIns="0" tIns="0" bIns="0" anchor="ctr"/>
           <a:p>
             <a:pPr algn="ctr"/>
-            <a:endParaRPr/>
+            <a:endParaRPr b="0" lang="en-US" sz="4400" spc="-1" strike="noStrike">
+              <a:solidFill>
+                <a:srgbClr val="000000"/>
+              </a:solidFill>
+              <a:uFill>
+                <a:solidFill>
+                  <a:srgbClr val="ffffff"/>
+                </a:solidFill>
+              </a:uFill>
+              <a:latin typeface="Arial"/>
+            </a:endParaRPr>
           </a:p>
         </p:txBody>
       </p:sp>
@@ -738,7 +1056,7 @@
 </file>
 
 <file path=ppt/slideLayouts/slideLayout6.xml><?xml version="1.0" encoding="utf-8"?>
-<p:sldLayout xmlns:a="http://schemas.openxmlformats.org/drawingml/2006/main" xmlns:p="http://schemas.openxmlformats.org/presentationml/2006/main" xmlns:r="http://schemas.openxmlformats.org/officeDocument/2006/relationships" type="objOnly" preserve="1">
+<p:sldLayout xmlns:a="http://schemas.openxmlformats.org/drawingml/2006/main" xmlns:p="http://schemas.openxmlformats.org/presentationml/2006/main" xmlns:r="http://schemas.openxmlformats.org/officeDocument/2006/relationships" xmlns:p14="http://schemas.microsoft.com/office/powerpoint/2010/main" xmlns:p15="http://schemas.microsoft.com/office/powerpoint/2012/main" xmlns:mc="http://schemas.openxmlformats.org/markup-compatibility/2006" type="objOnly" preserve="1">
   <p:cSld name="Centered Text">
     <p:spTree>
       <p:nvGrpSpPr>
@@ -777,7 +1095,17 @@
           <a:bodyPr lIns="0" rIns="0" tIns="0" bIns="0" anchor="ctr"/>
           <a:p>
             <a:pPr algn="ctr"/>
-            <a:endParaRPr/>
+            <a:endParaRPr b="0" lang="en-US" sz="3200" spc="-1" strike="noStrike">
+              <a:solidFill>
+                <a:srgbClr val="000000"/>
+              </a:solidFill>
+              <a:uFill>
+                <a:solidFill>
+                  <a:srgbClr val="ffffff"/>
+                </a:solidFill>
+              </a:uFill>
+              <a:latin typeface="Arial"/>
+            </a:endParaRPr>
           </a:p>
         </p:txBody>
       </p:sp>
@@ -787,7 +1115,7 @@
 </file>
 
 <file path=ppt/slideLayouts/slideLayout7.xml><?xml version="1.0" encoding="utf-8"?>
-<p:sldLayout xmlns:a="http://schemas.openxmlformats.org/drawingml/2006/main" xmlns:p="http://schemas.openxmlformats.org/presentationml/2006/main" xmlns:r="http://schemas.openxmlformats.org/officeDocument/2006/relationships" type="twoObjAndObj" preserve="1">
+<p:sldLayout xmlns:a="http://schemas.openxmlformats.org/drawingml/2006/main" xmlns:p="http://schemas.openxmlformats.org/presentationml/2006/main" xmlns:r="http://schemas.openxmlformats.org/officeDocument/2006/relationships" xmlns:p14="http://schemas.microsoft.com/office/powerpoint/2010/main" xmlns:p15="http://schemas.microsoft.com/office/powerpoint/2012/main" xmlns:mc="http://schemas.openxmlformats.org/markup-compatibility/2006" type="twoObjAndObj" preserve="1">
   <p:cSld name="Title, 2 Content and Content">
     <p:spTree>
       <p:nvGrpSpPr>
@@ -826,7 +1154,17 @@
           <a:bodyPr lIns="0" rIns="0" tIns="0" bIns="0" anchor="ctr"/>
           <a:p>
             <a:pPr algn="ctr"/>
-            <a:endParaRPr/>
+            <a:endParaRPr b="0" lang="en-US" sz="4400" spc="-1" strike="noStrike">
+              <a:solidFill>
+                <a:srgbClr val="000000"/>
+              </a:solidFill>
+              <a:uFill>
+                <a:solidFill>
+                  <a:srgbClr val="ffffff"/>
+                </a:solidFill>
+              </a:uFill>
+              <a:latin typeface="Arial"/>
+            </a:endParaRPr>
           </a:p>
         </p:txBody>
       </p:sp>
@@ -850,9 +1188,21 @@
           </a:prstGeom>
         </p:spPr>
         <p:txBody>
-          <a:bodyPr lIns="0" rIns="0" tIns="0" bIns="0"/>
-          <a:p>
-            <a:endParaRPr/>
+          <a:bodyPr lIns="0" rIns="0" tIns="0" bIns="0">
+            <a:normAutofit/>
+          </a:bodyPr>
+          <a:p>
+            <a:endParaRPr b="0" lang="en-US" sz="3200" spc="-1" strike="noStrike">
+              <a:solidFill>
+                <a:srgbClr val="000000"/>
+              </a:solidFill>
+              <a:uFill>
+                <a:solidFill>
+                  <a:srgbClr val="ffffff"/>
+                </a:solidFill>
+              </a:uFill>
+              <a:latin typeface="Arial"/>
+            </a:endParaRPr>
           </a:p>
         </p:txBody>
       </p:sp>
@@ -876,9 +1226,21 @@
           </a:prstGeom>
         </p:spPr>
         <p:txBody>
-          <a:bodyPr lIns="0" rIns="0" tIns="0" bIns="0"/>
-          <a:p>
-            <a:endParaRPr/>
+          <a:bodyPr lIns="0" rIns="0" tIns="0" bIns="0">
+            <a:normAutofit/>
+          </a:bodyPr>
+          <a:p>
+            <a:endParaRPr b="0" lang="en-US" sz="3200" spc="-1" strike="noStrike">
+              <a:solidFill>
+                <a:srgbClr val="000000"/>
+              </a:solidFill>
+              <a:uFill>
+                <a:solidFill>
+                  <a:srgbClr val="ffffff"/>
+                </a:solidFill>
+              </a:uFill>
+              <a:latin typeface="Arial"/>
+            </a:endParaRPr>
           </a:p>
         </p:txBody>
       </p:sp>
@@ -902,9 +1264,21 @@
           </a:prstGeom>
         </p:spPr>
         <p:txBody>
-          <a:bodyPr lIns="0" rIns="0" tIns="0" bIns="0"/>
-          <a:p>
-            <a:endParaRPr/>
+          <a:bodyPr lIns="0" rIns="0" tIns="0" bIns="0">
+            <a:normAutofit/>
+          </a:bodyPr>
+          <a:p>
+            <a:endParaRPr b="0" lang="en-US" sz="3200" spc="-1" strike="noStrike">
+              <a:solidFill>
+                <a:srgbClr val="000000"/>
+              </a:solidFill>
+              <a:uFill>
+                <a:solidFill>
+                  <a:srgbClr val="ffffff"/>
+                </a:solidFill>
+              </a:uFill>
+              <a:latin typeface="Arial"/>
+            </a:endParaRPr>
           </a:p>
         </p:txBody>
       </p:sp>
@@ -914,7 +1288,7 @@
 </file>
 
 <file path=ppt/slideLayouts/slideLayout8.xml><?xml version="1.0" encoding="utf-8"?>
-<p:sldLayout xmlns:a="http://schemas.openxmlformats.org/drawingml/2006/main" xmlns:p="http://schemas.openxmlformats.org/presentationml/2006/main" xmlns:r="http://schemas.openxmlformats.org/officeDocument/2006/relationships" type="objAndTwoObj" preserve="1">
+<p:sldLayout xmlns:a="http://schemas.openxmlformats.org/drawingml/2006/main" xmlns:p="http://schemas.openxmlformats.org/presentationml/2006/main" xmlns:r="http://schemas.openxmlformats.org/officeDocument/2006/relationships" xmlns:p14="http://schemas.microsoft.com/office/powerpoint/2010/main" xmlns:p15="http://schemas.microsoft.com/office/powerpoint/2012/main" xmlns:mc="http://schemas.openxmlformats.org/markup-compatibility/2006" type="objAndTwoObj" preserve="1">
   <p:cSld name="Title Content and 2 Content">
     <p:spTree>
       <p:nvGrpSpPr>
@@ -953,7 +1327,17 @@
           <a:bodyPr lIns="0" rIns="0" tIns="0" bIns="0" anchor="ctr"/>
           <a:p>
             <a:pPr algn="ctr"/>
-            <a:endParaRPr/>
+            <a:endParaRPr b="0" lang="en-US" sz="4400" spc="-1" strike="noStrike">
+              <a:solidFill>
+                <a:srgbClr val="000000"/>
+              </a:solidFill>
+              <a:uFill>
+                <a:solidFill>
+                  <a:srgbClr val="ffffff"/>
+                </a:solidFill>
+              </a:uFill>
+              <a:latin typeface="Arial"/>
+            </a:endParaRPr>
           </a:p>
         </p:txBody>
       </p:sp>
@@ -977,9 +1361,21 @@
           </a:prstGeom>
         </p:spPr>
         <p:txBody>
-          <a:bodyPr lIns="0" rIns="0" tIns="0" bIns="0"/>
-          <a:p>
-            <a:endParaRPr/>
+          <a:bodyPr lIns="0" rIns="0" tIns="0" bIns="0">
+            <a:normAutofit/>
+          </a:bodyPr>
+          <a:p>
+            <a:endParaRPr b="0" lang="en-US" sz="3200" spc="-1" strike="noStrike">
+              <a:solidFill>
+                <a:srgbClr val="000000"/>
+              </a:solidFill>
+              <a:uFill>
+                <a:solidFill>
+                  <a:srgbClr val="ffffff"/>
+                </a:solidFill>
+              </a:uFill>
+              <a:latin typeface="Arial"/>
+            </a:endParaRPr>
           </a:p>
         </p:txBody>
       </p:sp>
@@ -1003,9 +1399,21 @@
           </a:prstGeom>
         </p:spPr>
         <p:txBody>
-          <a:bodyPr lIns="0" rIns="0" tIns="0" bIns="0"/>
-          <a:p>
-            <a:endParaRPr/>
+          <a:bodyPr lIns="0" rIns="0" tIns="0" bIns="0">
+            <a:normAutofit/>
+          </a:bodyPr>
+          <a:p>
+            <a:endParaRPr b="0" lang="en-US" sz="3200" spc="-1" strike="noStrike">
+              <a:solidFill>
+                <a:srgbClr val="000000"/>
+              </a:solidFill>
+              <a:uFill>
+                <a:solidFill>
+                  <a:srgbClr val="ffffff"/>
+                </a:solidFill>
+              </a:uFill>
+              <a:latin typeface="Arial"/>
+            </a:endParaRPr>
           </a:p>
         </p:txBody>
       </p:sp>
@@ -1029,9 +1437,21 @@
           </a:prstGeom>
         </p:spPr>
         <p:txBody>
-          <a:bodyPr lIns="0" rIns="0" tIns="0" bIns="0"/>
-          <a:p>
-            <a:endParaRPr/>
+          <a:bodyPr lIns="0" rIns="0" tIns="0" bIns="0">
+            <a:normAutofit/>
+          </a:bodyPr>
+          <a:p>
+            <a:endParaRPr b="0" lang="en-US" sz="3200" spc="-1" strike="noStrike">
+              <a:solidFill>
+                <a:srgbClr val="000000"/>
+              </a:solidFill>
+              <a:uFill>
+                <a:solidFill>
+                  <a:srgbClr val="ffffff"/>
+                </a:solidFill>
+              </a:uFill>
+              <a:latin typeface="Arial"/>
+            </a:endParaRPr>
           </a:p>
         </p:txBody>
       </p:sp>
@@ -1041,7 +1461,7 @@
 </file>
 
 <file path=ppt/slideLayouts/slideLayout9.xml><?xml version="1.0" encoding="utf-8"?>
-<p:sldLayout xmlns:a="http://schemas.openxmlformats.org/drawingml/2006/main" xmlns:p="http://schemas.openxmlformats.org/presentationml/2006/main" xmlns:r="http://schemas.openxmlformats.org/officeDocument/2006/relationships" type="twoObjOverTx" preserve="1">
+<p:sldLayout xmlns:a="http://schemas.openxmlformats.org/drawingml/2006/main" xmlns:p="http://schemas.openxmlformats.org/presentationml/2006/main" xmlns:r="http://schemas.openxmlformats.org/officeDocument/2006/relationships" xmlns:p14="http://schemas.microsoft.com/office/powerpoint/2010/main" xmlns:p15="http://schemas.microsoft.com/office/powerpoint/2012/main" xmlns:mc="http://schemas.openxmlformats.org/markup-compatibility/2006" type="twoObjOverTx" preserve="1">
   <p:cSld name="Title, 2 Content over Content">
     <p:spTree>
       <p:nvGrpSpPr>
@@ -1080,7 +1500,17 @@
           <a:bodyPr lIns="0" rIns="0" tIns="0" bIns="0" anchor="ctr"/>
           <a:p>
             <a:pPr algn="ctr"/>
-            <a:endParaRPr/>
+            <a:endParaRPr b="0" lang="en-US" sz="4400" spc="-1" strike="noStrike">
+              <a:solidFill>
+                <a:srgbClr val="000000"/>
+              </a:solidFill>
+              <a:uFill>
+                <a:solidFill>
+                  <a:srgbClr val="ffffff"/>
+                </a:solidFill>
+              </a:uFill>
+              <a:latin typeface="Arial"/>
+            </a:endParaRPr>
           </a:p>
         </p:txBody>
       </p:sp>
@@ -1104,9 +1534,21 @@
           </a:prstGeom>
         </p:spPr>
         <p:txBody>
-          <a:bodyPr lIns="0" rIns="0" tIns="0" bIns="0"/>
-          <a:p>
-            <a:endParaRPr/>
+          <a:bodyPr lIns="0" rIns="0" tIns="0" bIns="0">
+            <a:normAutofit/>
+          </a:bodyPr>
+          <a:p>
+            <a:endParaRPr b="0" lang="en-US" sz="3200" spc="-1" strike="noStrike">
+              <a:solidFill>
+                <a:srgbClr val="000000"/>
+              </a:solidFill>
+              <a:uFill>
+                <a:solidFill>
+                  <a:srgbClr val="ffffff"/>
+                </a:solidFill>
+              </a:uFill>
+              <a:latin typeface="Arial"/>
+            </a:endParaRPr>
           </a:p>
         </p:txBody>
       </p:sp>
@@ -1130,9 +1572,21 @@
           </a:prstGeom>
         </p:spPr>
         <p:txBody>
-          <a:bodyPr lIns="0" rIns="0" tIns="0" bIns="0"/>
-          <a:p>
-            <a:endParaRPr/>
+          <a:bodyPr lIns="0" rIns="0" tIns="0" bIns="0">
+            <a:normAutofit/>
+          </a:bodyPr>
+          <a:p>
+            <a:endParaRPr b="0" lang="en-US" sz="3200" spc="-1" strike="noStrike">
+              <a:solidFill>
+                <a:srgbClr val="000000"/>
+              </a:solidFill>
+              <a:uFill>
+                <a:solidFill>
+                  <a:srgbClr val="ffffff"/>
+                </a:solidFill>
+              </a:uFill>
+              <a:latin typeface="Arial"/>
+            </a:endParaRPr>
           </a:p>
         </p:txBody>
       </p:sp>
@@ -1156,9 +1610,21 @@
           </a:prstGeom>
         </p:spPr>
         <p:txBody>
-          <a:bodyPr lIns="0" rIns="0" tIns="0" bIns="0"/>
-          <a:p>
-            <a:endParaRPr/>
+          <a:bodyPr lIns="0" rIns="0" tIns="0" bIns="0">
+            <a:normAutofit/>
+          </a:bodyPr>
+          <a:p>
+            <a:endParaRPr b="0" lang="en-US" sz="3200" spc="-1" strike="noStrike">
+              <a:solidFill>
+                <a:srgbClr val="000000"/>
+              </a:solidFill>
+              <a:uFill>
+                <a:solidFill>
+                  <a:srgbClr val="ffffff"/>
+                </a:solidFill>
+              </a:uFill>
+              <a:latin typeface="Arial"/>
+            </a:endParaRPr>
           </a:p>
         </p:txBody>
       </p:sp>
@@ -1168,7 +1634,7 @@
 </file>
 
 <file path=ppt/slideMasters/slideMaster1.xml><?xml version="1.0" encoding="utf-8"?>
-<p:sldMaster xmlns:a="http://schemas.openxmlformats.org/drawingml/2006/main" xmlns:p="http://schemas.openxmlformats.org/presentationml/2006/main" xmlns:r="http://schemas.openxmlformats.org/officeDocument/2006/relationships">
+<p:sldMaster xmlns:a="http://schemas.openxmlformats.org/drawingml/2006/main" xmlns:p="http://schemas.openxmlformats.org/presentationml/2006/main" xmlns:r="http://schemas.openxmlformats.org/officeDocument/2006/relationships" xmlns:p14="http://schemas.microsoft.com/office/powerpoint/2010/main" xmlns:p15="http://schemas.microsoft.com/office/powerpoint/2012/main" xmlns:mc="http://schemas.openxmlformats.org/markup-compatibility/2006">
   <p:cSld>
     <p:spTree>
       <p:nvGrpSpPr>
@@ -1208,12 +1674,30 @@
           <a:p>
             <a:pPr algn="ctr"/>
             <a:r>
-              <a:rPr lang="en-US" sz="4400">
+              <a:rPr b="0" lang="en-US" sz="4400" spc="-1" strike="noStrike">
+                <a:solidFill>
+                  <a:srgbClr val="000000"/>
+                </a:solidFill>
+                <a:uFill>
+                  <a:solidFill>
+                    <a:srgbClr val="ffffff"/>
+                  </a:solidFill>
+                </a:uFill>
                 <a:latin typeface="Arial"/>
               </a:rPr>
               <a:t>Click to edit the title text format</a:t>
             </a:r>
-            <a:endParaRPr/>
+            <a:endParaRPr b="0" lang="en-US" sz="4400" spc="-1" strike="noStrike">
+              <a:solidFill>
+                <a:srgbClr val="000000"/>
+              </a:solidFill>
+              <a:uFill>
+                <a:solidFill>
+                  <a:srgbClr val="ffffff"/>
+                </a:solidFill>
+              </a:uFill>
+              <a:latin typeface="Arial"/>
+            </a:endParaRPr>
           </a:p>
         </p:txBody>
       </p:sp>
@@ -1237,104 +1721,274 @@
           </a:prstGeom>
         </p:spPr>
         <p:txBody>
-          <a:bodyPr lIns="0" rIns="0" tIns="0" bIns="0"/>
-          <a:p>
-            <a:pPr>
+          <a:bodyPr lIns="0" rIns="0" tIns="0" bIns="0">
+            <a:normAutofit/>
+          </a:bodyPr>
+          <a:p>
+            <a:pPr marL="432000" indent="-324000">
+              <a:spcBef>
+                <a:spcPts val="1417"/>
+              </a:spcBef>
+              <a:buClr>
+                <a:srgbClr val="000000"/>
+              </a:buClr>
               <a:buSzPct val="45000"/>
-              <a:buFont typeface="StarSymbol"/>
+              <a:buFont typeface="Wingdings" charset="2"/>
               <a:buChar char=""/>
             </a:pPr>
             <a:r>
-              <a:rPr lang="en-US" sz="3200">
+              <a:rPr b="0" lang="en-US" sz="3200" spc="-1" strike="noStrike">
+                <a:solidFill>
+                  <a:srgbClr val="000000"/>
+                </a:solidFill>
+                <a:uFill>
+                  <a:solidFill>
+                    <a:srgbClr val="ffffff"/>
+                  </a:solidFill>
+                </a:uFill>
                 <a:latin typeface="Arial"/>
               </a:rPr>
               <a:t>Click to edit the outline text format</a:t>
             </a:r>
-            <a:endParaRPr/>
-          </a:p>
-          <a:p>
-            <a:pPr lvl="1">
+            <a:endParaRPr b="0" lang="en-US" sz="3200" spc="-1" strike="noStrike">
+              <a:solidFill>
+                <a:srgbClr val="000000"/>
+              </a:solidFill>
+              <a:uFill>
+                <a:solidFill>
+                  <a:srgbClr val="ffffff"/>
+                </a:solidFill>
+              </a:uFill>
+              <a:latin typeface="Arial"/>
+            </a:endParaRPr>
+          </a:p>
+          <a:p>
+            <a:pPr lvl="1" marL="864000" indent="-324000">
+              <a:spcBef>
+                <a:spcPts val="1134"/>
+              </a:spcBef>
+              <a:buClr>
+                <a:srgbClr val="000000"/>
+              </a:buClr>
               <a:buSzPct val="75000"/>
-              <a:buFont typeface="StarSymbol"/>
+              <a:buFont typeface="Symbol" charset="2"/>
               <a:buChar char=""/>
             </a:pPr>
             <a:r>
-              <a:rPr lang="en-US" sz="2800">
+              <a:rPr b="0" lang="en-US" sz="2800" spc="-1" strike="noStrike">
+                <a:solidFill>
+                  <a:srgbClr val="000000"/>
+                </a:solidFill>
+                <a:uFill>
+                  <a:solidFill>
+                    <a:srgbClr val="ffffff"/>
+                  </a:solidFill>
+                </a:uFill>
                 <a:latin typeface="Arial"/>
               </a:rPr>
               <a:t>Second Outline Level</a:t>
             </a:r>
-            <a:endParaRPr/>
-          </a:p>
-          <a:p>
-            <a:pPr lvl="2">
+            <a:endParaRPr b="0" lang="en-US" sz="2800" spc="-1" strike="noStrike">
+              <a:solidFill>
+                <a:srgbClr val="000000"/>
+              </a:solidFill>
+              <a:uFill>
+                <a:solidFill>
+                  <a:srgbClr val="ffffff"/>
+                </a:solidFill>
+              </a:uFill>
+              <a:latin typeface="Arial"/>
+            </a:endParaRPr>
+          </a:p>
+          <a:p>
+            <a:pPr lvl="2" marL="1296000" indent="-288000">
+              <a:spcBef>
+                <a:spcPts val="850"/>
+              </a:spcBef>
+              <a:buClr>
+                <a:srgbClr val="000000"/>
+              </a:buClr>
               <a:buSzPct val="45000"/>
-              <a:buFont typeface="StarSymbol"/>
+              <a:buFont typeface="Wingdings" charset="2"/>
               <a:buChar char=""/>
             </a:pPr>
             <a:r>
-              <a:rPr lang="en-US" sz="2400">
+              <a:rPr b="0" lang="en-US" sz="2400" spc="-1" strike="noStrike">
+                <a:solidFill>
+                  <a:srgbClr val="000000"/>
+                </a:solidFill>
+                <a:uFill>
+                  <a:solidFill>
+                    <a:srgbClr val="ffffff"/>
+                  </a:solidFill>
+                </a:uFill>
                 <a:latin typeface="Arial"/>
               </a:rPr>
               <a:t>Third Outline Level</a:t>
             </a:r>
-            <a:endParaRPr/>
-          </a:p>
-          <a:p>
-            <a:pPr lvl="3">
+            <a:endParaRPr b="0" lang="en-US" sz="2400" spc="-1" strike="noStrike">
+              <a:solidFill>
+                <a:srgbClr val="000000"/>
+              </a:solidFill>
+              <a:uFill>
+                <a:solidFill>
+                  <a:srgbClr val="ffffff"/>
+                </a:solidFill>
+              </a:uFill>
+              <a:latin typeface="Arial"/>
+            </a:endParaRPr>
+          </a:p>
+          <a:p>
+            <a:pPr lvl="3" marL="1728000" indent="-216000">
+              <a:spcBef>
+                <a:spcPts val="567"/>
+              </a:spcBef>
+              <a:buClr>
+                <a:srgbClr val="000000"/>
+              </a:buClr>
               <a:buSzPct val="75000"/>
-              <a:buFont typeface="StarSymbol"/>
+              <a:buFont typeface="Symbol" charset="2"/>
               <a:buChar char=""/>
             </a:pPr>
             <a:r>
-              <a:rPr lang="en-US" sz="2000">
+              <a:rPr b="0" lang="en-US" sz="2000" spc="-1" strike="noStrike">
+                <a:solidFill>
+                  <a:srgbClr val="000000"/>
+                </a:solidFill>
+                <a:uFill>
+                  <a:solidFill>
+                    <a:srgbClr val="ffffff"/>
+                  </a:solidFill>
+                </a:uFill>
                 <a:latin typeface="Arial"/>
               </a:rPr>
               <a:t>Fourth Outline Level</a:t>
             </a:r>
-            <a:endParaRPr/>
-          </a:p>
-          <a:p>
-            <a:pPr lvl="4">
+            <a:endParaRPr b="0" lang="en-US" sz="2000" spc="-1" strike="noStrike">
+              <a:solidFill>
+                <a:srgbClr val="000000"/>
+              </a:solidFill>
+              <a:uFill>
+                <a:solidFill>
+                  <a:srgbClr val="ffffff"/>
+                </a:solidFill>
+              </a:uFill>
+              <a:latin typeface="Arial"/>
+            </a:endParaRPr>
+          </a:p>
+          <a:p>
+            <a:pPr lvl="4" marL="2160000" indent="-216000">
+              <a:spcBef>
+                <a:spcPts val="283"/>
+              </a:spcBef>
+              <a:buClr>
+                <a:srgbClr val="000000"/>
+              </a:buClr>
               <a:buSzPct val="45000"/>
-              <a:buFont typeface="StarSymbol"/>
+              <a:buFont typeface="Wingdings" charset="2"/>
               <a:buChar char=""/>
             </a:pPr>
             <a:r>
-              <a:rPr lang="en-US" sz="2000">
+              <a:rPr b="0" lang="en-US" sz="2000" spc="-1" strike="noStrike">
+                <a:solidFill>
+                  <a:srgbClr val="000000"/>
+                </a:solidFill>
+                <a:uFill>
+                  <a:solidFill>
+                    <a:srgbClr val="ffffff"/>
+                  </a:solidFill>
+                </a:uFill>
                 <a:latin typeface="Arial"/>
               </a:rPr>
               <a:t>Fifth Outline Level</a:t>
             </a:r>
-            <a:endParaRPr/>
-          </a:p>
-          <a:p>
-            <a:pPr lvl="5">
+            <a:endParaRPr b="0" lang="en-US" sz="2000" spc="-1" strike="noStrike">
+              <a:solidFill>
+                <a:srgbClr val="000000"/>
+              </a:solidFill>
+              <a:uFill>
+                <a:solidFill>
+                  <a:srgbClr val="ffffff"/>
+                </a:solidFill>
+              </a:uFill>
+              <a:latin typeface="Arial"/>
+            </a:endParaRPr>
+          </a:p>
+          <a:p>
+            <a:pPr lvl="5" marL="2592000" indent="-216000">
+              <a:spcBef>
+                <a:spcPts val="283"/>
+              </a:spcBef>
+              <a:buClr>
+                <a:srgbClr val="000000"/>
+              </a:buClr>
               <a:buSzPct val="45000"/>
-              <a:buFont typeface="StarSymbol"/>
+              <a:buFont typeface="Wingdings" charset="2"/>
               <a:buChar char=""/>
             </a:pPr>
             <a:r>
-              <a:rPr lang="en-US" sz="2000">
+              <a:rPr b="0" lang="en-US" sz="2000" spc="-1" strike="noStrike">
+                <a:solidFill>
+                  <a:srgbClr val="000000"/>
+                </a:solidFill>
+                <a:uFill>
+                  <a:solidFill>
+                    <a:srgbClr val="ffffff"/>
+                  </a:solidFill>
+                </a:uFill>
                 <a:latin typeface="Arial"/>
               </a:rPr>
               <a:t>Sixth Outline Level</a:t>
             </a:r>
-            <a:endParaRPr/>
-          </a:p>
-          <a:p>
-            <a:pPr lvl="6">
+            <a:endParaRPr b="0" lang="en-US" sz="2000" spc="-1" strike="noStrike">
+              <a:solidFill>
+                <a:srgbClr val="000000"/>
+              </a:solidFill>
+              <a:uFill>
+                <a:solidFill>
+                  <a:srgbClr val="ffffff"/>
+                </a:solidFill>
+              </a:uFill>
+              <a:latin typeface="Arial"/>
+            </a:endParaRPr>
+          </a:p>
+          <a:p>
+            <a:pPr lvl="6" marL="3024000" indent="-216000">
+              <a:spcBef>
+                <a:spcPts val="283"/>
+              </a:spcBef>
+              <a:buClr>
+                <a:srgbClr val="000000"/>
+              </a:buClr>
               <a:buSzPct val="45000"/>
-              <a:buFont typeface="StarSymbol"/>
+              <a:buFont typeface="Wingdings" charset="2"/>
               <a:buChar char=""/>
             </a:pPr>
             <a:r>
-              <a:rPr lang="en-US" sz="2000">
+              <a:rPr b="0" lang="en-US" sz="2000" spc="-1" strike="noStrike">
+                <a:solidFill>
+                  <a:srgbClr val="000000"/>
+                </a:solidFill>
+                <a:uFill>
+                  <a:solidFill>
+                    <a:srgbClr val="ffffff"/>
+                  </a:solidFill>
+                </a:uFill>
                 <a:latin typeface="Arial"/>
               </a:rPr>
               <a:t>Seventh Outline Level</a:t>
             </a:r>
-            <a:endParaRPr/>
+            <a:endParaRPr b="0" lang="en-US" sz="2000" spc="-1" strike="noStrike">
+              <a:solidFill>
+                <a:srgbClr val="000000"/>
+              </a:solidFill>
+              <a:uFill>
+                <a:solidFill>
+                  <a:srgbClr val="ffffff"/>
+                </a:solidFill>
+              </a:uFill>
+              <a:latin typeface="Arial"/>
+            </a:endParaRPr>
           </a:p>
         </p:txBody>
       </p:sp>
@@ -1359,7 +2013,7 @@
 </file>
 
 <file path=ppt/slides/slide1.xml><?xml version="1.0" encoding="utf-8"?>
-<p:sld xmlns:a="http://schemas.openxmlformats.org/drawingml/2006/main" xmlns:p="http://schemas.openxmlformats.org/presentationml/2006/main" xmlns:r="http://schemas.openxmlformats.org/officeDocument/2006/relationships">
+<p:sld xmlns:a="http://schemas.openxmlformats.org/drawingml/2006/main" xmlns:p="http://schemas.openxmlformats.org/presentationml/2006/main" xmlns:r="http://schemas.openxmlformats.org/officeDocument/2006/relationships" xmlns:p14="http://schemas.microsoft.com/office/powerpoint/2010/main" xmlns:p15="http://schemas.microsoft.com/office/powerpoint/2012/main" xmlns:mc="http://schemas.openxmlformats.org/markup-compatibility/2006">
   <p:cSld>
     <p:spTree>
       <p:nvGrpSpPr>
@@ -1375,6 +2029,52 @@
           <a:chExt cx="0" cy="0"/>
         </a:xfrm>
       </p:grpSpPr>
+      <p:pic>
+        <p:nvPicPr>
+          <p:cNvPr id="38" name="Picture 86" descr=""/>
+          <p:cNvPicPr/>
+          <p:nvPr/>
+        </p:nvPicPr>
+        <p:blipFill>
+          <a:blip r:embed="rId1"/>
+          <a:stretch/>
+        </p:blipFill>
+        <p:spPr>
+          <a:xfrm>
+            <a:off x="231120" y="684360"/>
+            <a:ext cx="3333240" cy="2221920"/>
+          </a:xfrm>
+          <a:prstGeom prst="rect">
+            <a:avLst/>
+          </a:prstGeom>
+          <a:ln>
+            <a:noFill/>
+          </a:ln>
+        </p:spPr>
+      </p:pic>
+      <p:pic>
+        <p:nvPicPr>
+          <p:cNvPr id="39" name="Picture 2" descr=""/>
+          <p:cNvPicPr/>
+          <p:nvPr/>
+        </p:nvPicPr>
+        <p:blipFill>
+          <a:blip r:embed="rId2"/>
+          <a:stretch/>
+        </p:blipFill>
+        <p:spPr>
+          <a:xfrm>
+            <a:off x="1382760" y="841680"/>
+            <a:ext cx="7314840" cy="5876640"/>
+          </a:xfrm>
+          <a:prstGeom prst="rect">
+            <a:avLst/>
+          </a:prstGeom>
+          <a:ln>
+            <a:noFill/>
+          </a:ln>
+        </p:spPr>
+      </p:pic>
     </p:spTree>
   </p:cSld>
   <p:timing>
@@ -1408,7 +2108,7 @@
 </file>
 
 <file path=ppt/slides/slide2.xml><?xml version="1.0" encoding="utf-8"?>
-<p:sld xmlns:a="http://schemas.openxmlformats.org/drawingml/2006/main" xmlns:p="http://schemas.openxmlformats.org/presentationml/2006/main" xmlns:r="http://schemas.openxmlformats.org/officeDocument/2006/relationships">
+<p:sld xmlns:a="http://schemas.openxmlformats.org/drawingml/2006/main" xmlns:p="http://schemas.openxmlformats.org/presentationml/2006/main" xmlns:r="http://schemas.openxmlformats.org/officeDocument/2006/relationships" xmlns:p14="http://schemas.microsoft.com/office/powerpoint/2010/main" xmlns:p15="http://schemas.microsoft.com/office/powerpoint/2012/main" xmlns:mc="http://schemas.openxmlformats.org/markup-compatibility/2006">
   <p:cSld>
     <p:spTree>
       <p:nvGrpSpPr>
@@ -1426,7 +2126,7 @@
       </p:grpSpPr>
       <p:pic>
         <p:nvPicPr>
-          <p:cNvPr id="36" name="" descr=""/>
+          <p:cNvPr id="40" name="" descr=""/>
           <p:cNvPicPr/>
           <p:nvPr/>
         </p:nvPicPr>
@@ -1436,8 +2136,8 @@
         </p:blipFill>
         <p:spPr>
           <a:xfrm>
-            <a:off x="627120" y="914400"/>
-            <a:ext cx="9156240" cy="5668560"/>
+            <a:off x="822960" y="182880"/>
+            <a:ext cx="7646760" cy="7559280"/>
           </a:xfrm>
           <a:prstGeom prst="rect">
             <a:avLst/>
@@ -1449,14 +2149,14 @@
       </p:pic>
       <p:sp>
         <p:nvSpPr>
-          <p:cNvPr id="37" name="Line 1"/>
+          <p:cNvPr id="41" name="Line 1"/>
           <p:cNvSpPr/>
           <p:nvPr/>
         </p:nvSpPr>
         <p:spPr>
           <a:xfrm>
-            <a:off x="1554480" y="4114800"/>
-            <a:ext cx="0" cy="3200400"/>
+            <a:off x="1645200" y="4297680"/>
+            <a:ext cx="360" cy="3200400"/>
           </a:xfrm>
           <a:prstGeom prst="line">
             <a:avLst/>
@@ -1469,17 +2169,23 @@
             <a:tailEnd len="med" type="diamond" w="med"/>
           </a:ln>
         </p:spPr>
-      </p:sp>
-      <p:sp>
-        <p:nvSpPr>
-          <p:cNvPr id="38" name="Line 2"/>
+        <p:style>
+          <a:lnRef idx="0"/>
+          <a:fillRef idx="0"/>
+          <a:effectRef idx="0"/>
+          <a:fontRef idx="minor"/>
+        </p:style>
+      </p:sp>
+      <p:sp>
+        <p:nvSpPr>
+          <p:cNvPr id="42" name="Line 2"/>
           <p:cNvSpPr/>
           <p:nvPr/>
         </p:nvSpPr>
         <p:spPr>
           <a:xfrm>
-            <a:off x="1158840" y="4123440"/>
-            <a:ext cx="0" cy="3191760"/>
+            <a:off x="1096920" y="4306320"/>
+            <a:ext cx="360" cy="3191760"/>
           </a:xfrm>
           <a:prstGeom prst="line">
             <a:avLst/>
@@ -1492,16 +2198,22 @@
             <a:tailEnd len="med" type="diamond" w="med"/>
           </a:ln>
         </p:spPr>
-      </p:sp>
-      <p:sp>
-        <p:nvSpPr>
-          <p:cNvPr id="39" name="Line 3"/>
+        <p:style>
+          <a:lnRef idx="0"/>
+          <a:fillRef idx="0"/>
+          <a:effectRef idx="0"/>
+          <a:fontRef idx="minor"/>
+        </p:style>
+      </p:sp>
+      <p:sp>
+        <p:nvSpPr>
+          <p:cNvPr id="43" name="Line 3"/>
           <p:cNvSpPr/>
           <p:nvPr/>
         </p:nvSpPr>
         <p:spPr>
           <a:xfrm>
-            <a:off x="9601200" y="4023360"/>
+            <a:off x="7675560" y="4297680"/>
             <a:ext cx="5400" cy="3200400"/>
           </a:xfrm>
           <a:prstGeom prst="line">
@@ -1515,17 +2227,23 @@
             <a:tailEnd len="med" type="diamond" w="med"/>
           </a:ln>
         </p:spPr>
-      </p:sp>
-      <p:sp>
-        <p:nvSpPr>
-          <p:cNvPr id="40" name="Line 4"/>
+        <p:style>
+          <a:lnRef idx="0"/>
+          <a:fillRef idx="0"/>
+          <a:effectRef idx="0"/>
+          <a:fontRef idx="minor"/>
+        </p:style>
+      </p:sp>
+      <p:sp>
+        <p:nvSpPr>
+          <p:cNvPr id="44" name="Line 4"/>
           <p:cNvSpPr/>
           <p:nvPr/>
         </p:nvSpPr>
         <p:spPr>
           <a:xfrm>
-            <a:off x="91440" y="4114800"/>
-            <a:ext cx="0" cy="3200400"/>
+            <a:off x="4663440" y="4297680"/>
+            <a:ext cx="360" cy="3200400"/>
           </a:xfrm>
           <a:prstGeom prst="line">
             <a:avLst/>
@@ -1538,80 +2256,29 @@
             <a:tailEnd len="med" type="diamond" w="med"/>
           </a:ln>
         </p:spPr>
-      </p:sp>
-      <p:sp>
-        <p:nvSpPr>
-          <p:cNvPr id="41" name="CustomShape 5"/>
-          <p:cNvSpPr/>
-          <p:nvPr/>
-        </p:nvSpPr>
-        <p:spPr>
-          <a:xfrm>
-            <a:off x="1463040" y="1668600"/>
-            <a:ext cx="730800" cy="433800"/>
-          </a:xfrm>
-          <a:prstGeom prst="rect">
-            <a:avLst/>
-          </a:prstGeom>
-          <a:solidFill>
-            <a:srgbClr val="729fcf"/>
-          </a:solidFill>
-          <a:ln>
-            <a:noFill/>
-          </a:ln>
-        </p:spPr>
         <p:style>
           <a:lnRef idx="0"/>
           <a:fillRef idx="0"/>
           <a:effectRef idx="0"/>
           <a:fontRef idx="minor"/>
         </p:style>
-        <p:txBody>
-          <a:bodyPr lIns="90000" rIns="90000" tIns="45000" bIns="45000"/>
-          <a:p>
-            <a:r>
-              <a:rPr lang="en-US" sz="1200" strike="noStrike">
-                <a:solidFill>
-                  <a:srgbClr val="000000"/>
-                </a:solidFill>
-                <a:latin typeface="Arial"/>
-                <a:ea typeface="DejaVu Sans"/>
-              </a:rPr>
-              <a:t>NRE</a:t>
-            </a:r>
-            <a:endParaRPr/>
-          </a:p>
-          <a:p>
-            <a:r>
-              <a:rPr lang="en-US" sz="1200" strike="noStrike">
-                <a:solidFill>
-                  <a:srgbClr val="000000"/>
-                </a:solidFill>
-                <a:latin typeface="Arial"/>
-                <a:ea typeface="DejaVu Sans"/>
-              </a:rPr>
-              <a:t>400 K$</a:t>
-            </a:r>
-            <a:endParaRPr/>
-          </a:p>
-        </p:txBody>
-      </p:sp>
-      <p:sp>
-        <p:nvSpPr>
-          <p:cNvPr id="42" name="CustomShape 6"/>
+      </p:sp>
+      <p:sp>
+        <p:nvSpPr>
+          <p:cNvPr id="45" name="CustomShape 5"/>
           <p:cNvSpPr/>
           <p:nvPr/>
         </p:nvSpPr>
         <p:spPr>
           <a:xfrm>
-            <a:off x="7955280" y="1920240"/>
-            <a:ext cx="822240" cy="433800"/>
+            <a:off x="549720" y="1463040"/>
+            <a:ext cx="730440" cy="433440"/>
           </a:xfrm>
           <a:prstGeom prst="rect">
             <a:avLst/>
           </a:prstGeom>
           <a:solidFill>
-            <a:srgbClr val="729fcf"/>
+            <a:srgbClr val="ffff00"/>
           </a:solidFill>
           <a:ln>
             <a:noFill/>
@@ -1627,48 +2294,78 @@
           <a:bodyPr lIns="90000" rIns="90000" tIns="45000" bIns="45000"/>
           <a:p>
             <a:r>
-              <a:rPr lang="en-US" sz="1200" strike="noStrike">
+              <a:rPr b="0" lang="en-US" sz="1200" spc="-1" strike="noStrike">
                 <a:solidFill>
                   <a:srgbClr val="000000"/>
                 </a:solidFill>
+                <a:uFill>
+                  <a:solidFill>
+                    <a:srgbClr val="ffffff"/>
+                  </a:solidFill>
+                </a:uFill>
                 <a:latin typeface="Arial"/>
                 <a:ea typeface="DejaVu Sans"/>
               </a:rPr>
-              <a:t>Labelling</a:t>
+              <a:t>NRE</a:t>
             </a:r>
-            <a:endParaRPr/>
+            <a:endParaRPr b="0" lang="en-US" sz="1200" spc="-1" strike="noStrike">
+              <a:solidFill>
+                <a:srgbClr val="000000"/>
+              </a:solidFill>
+              <a:uFill>
+                <a:solidFill>
+                  <a:srgbClr val="ffffff"/>
+                </a:solidFill>
+              </a:uFill>
+              <a:latin typeface="Arial"/>
+            </a:endParaRPr>
           </a:p>
           <a:p>
             <a:r>
-              <a:rPr lang="en-US" sz="1200" strike="noStrike">
+              <a:rPr b="0" lang="en-US" sz="1200" spc="-1" strike="noStrike">
                 <a:solidFill>
                   <a:srgbClr val="000000"/>
                 </a:solidFill>
+                <a:uFill>
+                  <a:solidFill>
+                    <a:srgbClr val="ffffff"/>
+                  </a:solidFill>
+                </a:uFill>
                 <a:latin typeface="Arial"/>
                 <a:ea typeface="DejaVu Sans"/>
               </a:rPr>
-              <a:t>130 K$</a:t>
+              <a:t>440 K $</a:t>
             </a:r>
-            <a:endParaRPr/>
-          </a:p>
-        </p:txBody>
-      </p:sp>
-      <p:sp>
-        <p:nvSpPr>
-          <p:cNvPr id="43" name="CustomShape 7"/>
+            <a:endParaRPr b="0" lang="en-US" sz="1200" spc="-1" strike="noStrike">
+              <a:solidFill>
+                <a:srgbClr val="000000"/>
+              </a:solidFill>
+              <a:uFill>
+                <a:solidFill>
+                  <a:srgbClr val="ffffff"/>
+                </a:solidFill>
+              </a:uFill>
+              <a:latin typeface="Arial"/>
+            </a:endParaRPr>
+          </a:p>
+        </p:txBody>
+      </p:sp>
+      <p:sp>
+        <p:nvSpPr>
+          <p:cNvPr id="46" name="CustomShape 6"/>
           <p:cNvSpPr/>
           <p:nvPr/>
         </p:nvSpPr>
         <p:spPr>
           <a:xfrm>
-            <a:off x="8229600" y="457200"/>
-            <a:ext cx="822240" cy="605880"/>
+            <a:off x="7773480" y="1761120"/>
+            <a:ext cx="821880" cy="433440"/>
           </a:xfrm>
           <a:prstGeom prst="rect">
             <a:avLst/>
           </a:prstGeom>
           <a:solidFill>
-            <a:srgbClr val="729fcf"/>
+            <a:srgbClr val="2bd22b"/>
           </a:solidFill>
           <a:ln>
             <a:noFill/>
@@ -1684,61 +2381,78 @@
           <a:bodyPr lIns="90000" rIns="90000" tIns="45000" bIns="45000"/>
           <a:p>
             <a:r>
-              <a:rPr lang="en-US" sz="1200" strike="noStrike">
+              <a:rPr b="0" lang="en-US" sz="1200" spc="-1" strike="noStrike">
                 <a:solidFill>
                   <a:srgbClr val="000000"/>
                 </a:solidFill>
+                <a:uFill>
+                  <a:solidFill>
+                    <a:srgbClr val="ffffff"/>
+                  </a:solidFill>
+                </a:uFill>
                 <a:latin typeface="Arial"/>
                 <a:ea typeface="DejaVu Sans"/>
               </a:rPr>
-              <a:t>Learning </a:t>
+              <a:t>Labelling</a:t>
             </a:r>
-            <a:endParaRPr/>
+            <a:endParaRPr b="0" lang="en-US" sz="1200" spc="-1" strike="noStrike">
+              <a:solidFill>
+                <a:srgbClr val="000000"/>
+              </a:solidFill>
+              <a:uFill>
+                <a:solidFill>
+                  <a:srgbClr val="ffffff"/>
+                </a:solidFill>
+              </a:uFill>
+              <a:latin typeface="Arial"/>
+            </a:endParaRPr>
           </a:p>
           <a:p>
             <a:r>
-              <a:rPr lang="en-US" sz="1200" strike="noStrike">
+              <a:rPr b="0" lang="en-US" sz="1200" spc="-1" strike="noStrike">
                 <a:solidFill>
                   <a:srgbClr val="000000"/>
                 </a:solidFill>
+                <a:uFill>
+                  <a:solidFill>
+                    <a:srgbClr val="ffffff"/>
+                  </a:solidFill>
+                </a:uFill>
                 <a:latin typeface="Arial"/>
                 <a:ea typeface="DejaVu Sans"/>
               </a:rPr>
-              <a:t>Potential</a:t>
+              <a:t>130 K $</a:t>
             </a:r>
-            <a:endParaRPr/>
-          </a:p>
-          <a:p>
-            <a:r>
-              <a:rPr lang="en-US" sz="1200" strike="noStrike">
-                <a:solidFill>
-                  <a:srgbClr val="000000"/>
-                </a:solidFill>
-                <a:latin typeface="Arial"/>
-                <a:ea typeface="DejaVu Sans"/>
-              </a:rPr>
-              <a:t>60 cycles</a:t>
-            </a:r>
-            <a:endParaRPr/>
-          </a:p>
-        </p:txBody>
-      </p:sp>
-      <p:sp>
-        <p:nvSpPr>
-          <p:cNvPr id="44" name="CustomShape 8"/>
+            <a:endParaRPr b="0" lang="en-US" sz="1200" spc="-1" strike="noStrike">
+              <a:solidFill>
+                <a:srgbClr val="000000"/>
+              </a:solidFill>
+              <a:uFill>
+                <a:solidFill>
+                  <a:srgbClr val="ffffff"/>
+                </a:solidFill>
+              </a:uFill>
+              <a:latin typeface="Arial"/>
+            </a:endParaRPr>
+          </a:p>
+        </p:txBody>
+      </p:sp>
+      <p:sp>
+        <p:nvSpPr>
+          <p:cNvPr id="47" name="CustomShape 7"/>
           <p:cNvSpPr/>
           <p:nvPr/>
         </p:nvSpPr>
         <p:spPr>
           <a:xfrm>
-            <a:off x="8503920" y="1280160"/>
-            <a:ext cx="1005120" cy="261720"/>
+            <a:off x="6493320" y="308880"/>
+            <a:ext cx="821880" cy="605520"/>
           </a:xfrm>
           <a:prstGeom prst="rect">
             <a:avLst/>
           </a:prstGeom>
           <a:solidFill>
-            <a:srgbClr val="729fcf"/>
+            <a:srgbClr val="ff8d00"/>
           </a:solidFill>
           <a:ln>
             <a:noFill/>
@@ -1754,35 +2468,106 @@
           <a:bodyPr lIns="90000" rIns="90000" tIns="45000" bIns="45000"/>
           <a:p>
             <a:r>
-              <a:rPr lang="en-US" sz="1200" strike="noStrike">
+              <a:rPr b="0" lang="en-US" sz="1200" spc="-1" strike="noStrike">
                 <a:solidFill>
                   <a:srgbClr val="000000"/>
                 </a:solidFill>
+                <a:uFill>
+                  <a:solidFill>
+                    <a:srgbClr val="ffffff"/>
+                  </a:solidFill>
+                </a:uFill>
                 <a:latin typeface="Arial"/>
                 <a:ea typeface="DejaVu Sans"/>
               </a:rPr>
-              <a:t>VM 150 $</a:t>
+              <a:t>Learning </a:t>
             </a:r>
-            <a:endParaRPr/>
-          </a:p>
-        </p:txBody>
-      </p:sp>
-      <p:sp>
-        <p:nvSpPr>
-          <p:cNvPr id="45" name="CustomShape 9"/>
+            <a:endParaRPr b="0" lang="en-US" sz="1200" spc="-1" strike="noStrike">
+              <a:solidFill>
+                <a:srgbClr val="000000"/>
+              </a:solidFill>
+              <a:uFill>
+                <a:solidFill>
+                  <a:srgbClr val="ffffff"/>
+                </a:solidFill>
+              </a:uFill>
+              <a:latin typeface="Arial"/>
+            </a:endParaRPr>
+          </a:p>
+          <a:p>
+            <a:r>
+              <a:rPr b="0" lang="en-US" sz="1200" spc="-1" strike="noStrike">
+                <a:solidFill>
+                  <a:srgbClr val="000000"/>
+                </a:solidFill>
+                <a:uFill>
+                  <a:solidFill>
+                    <a:srgbClr val="ffffff"/>
+                  </a:solidFill>
+                </a:uFill>
+                <a:latin typeface="Arial"/>
+                <a:ea typeface="DejaVu Sans"/>
+              </a:rPr>
+              <a:t>Potential</a:t>
+            </a:r>
+            <a:endParaRPr b="0" lang="en-US" sz="1200" spc="-1" strike="noStrike">
+              <a:solidFill>
+                <a:srgbClr val="000000"/>
+              </a:solidFill>
+              <a:uFill>
+                <a:solidFill>
+                  <a:srgbClr val="ffffff"/>
+                </a:solidFill>
+              </a:uFill>
+              <a:latin typeface="Arial"/>
+            </a:endParaRPr>
+          </a:p>
+          <a:p>
+            <a:r>
+              <a:rPr b="0" lang="en-US" sz="1200" spc="-1" strike="noStrike">
+                <a:solidFill>
+                  <a:srgbClr val="000000"/>
+                </a:solidFill>
+                <a:uFill>
+                  <a:solidFill>
+                    <a:srgbClr val="ffffff"/>
+                  </a:solidFill>
+                </a:uFill>
+                <a:latin typeface="Arial"/>
+                <a:ea typeface="DejaVu Sans"/>
+              </a:rPr>
+              <a:t>60 cycles</a:t>
+            </a:r>
+            <a:endParaRPr b="0" lang="en-US" sz="1200" spc="-1" strike="noStrike">
+              <a:solidFill>
+                <a:srgbClr val="000000"/>
+              </a:solidFill>
+              <a:uFill>
+                <a:solidFill>
+                  <a:srgbClr val="ffffff"/>
+                </a:solidFill>
+              </a:uFill>
+              <a:latin typeface="Arial"/>
+            </a:endParaRPr>
+          </a:p>
+        </p:txBody>
+      </p:sp>
+      <p:sp>
+        <p:nvSpPr>
+          <p:cNvPr id="48" name="CustomShape 8"/>
           <p:cNvSpPr/>
           <p:nvPr/>
         </p:nvSpPr>
         <p:spPr>
           <a:xfrm>
-            <a:off x="6309360" y="5681160"/>
-            <a:ext cx="1005120" cy="261720"/>
+            <a:off x="7773480" y="1110240"/>
+            <a:ext cx="1004760" cy="261360"/>
           </a:xfrm>
           <a:prstGeom prst="rect">
             <a:avLst/>
           </a:prstGeom>
           <a:solidFill>
-            <a:srgbClr val="729fcf"/>
+            <a:srgbClr val="0000ff"/>
           </a:solidFill>
           <a:ln>
             <a:noFill/>
@@ -1798,35 +2583,50 @@
           <a:bodyPr lIns="90000" rIns="90000" tIns="45000" bIns="45000"/>
           <a:p>
             <a:r>
-              <a:rPr lang="en-US" sz="1200" strike="noStrike">
+              <a:rPr b="0" lang="en-US" sz="1200" spc="-1" strike="noStrike">
                 <a:solidFill>
                   <a:srgbClr val="000000"/>
                 </a:solidFill>
+                <a:uFill>
+                  <a:solidFill>
+                    <a:srgbClr val="ffffff"/>
+                  </a:solidFill>
+                </a:uFill>
                 <a:latin typeface="Arial"/>
                 <a:ea typeface="DejaVu Sans"/>
               </a:rPr>
-              <a:t>5K BATCH</a:t>
+              <a:t>VM 150 $</a:t>
             </a:r>
-            <a:endParaRPr/>
-          </a:p>
-        </p:txBody>
-      </p:sp>
-      <p:sp>
-        <p:nvSpPr>
-          <p:cNvPr id="46" name="CustomShape 10"/>
+            <a:endParaRPr b="0" lang="en-US" sz="1200" spc="-1" strike="noStrike">
+              <a:solidFill>
+                <a:srgbClr val="000000"/>
+              </a:solidFill>
+              <a:uFill>
+                <a:solidFill>
+                  <a:srgbClr val="ffffff"/>
+                </a:solidFill>
+              </a:uFill>
+              <a:latin typeface="Arial"/>
+            </a:endParaRPr>
+          </a:p>
+        </p:txBody>
+      </p:sp>
+      <p:sp>
+        <p:nvSpPr>
+          <p:cNvPr id="49" name="CustomShape 9"/>
           <p:cNvSpPr/>
           <p:nvPr/>
         </p:nvSpPr>
         <p:spPr>
           <a:xfrm>
-            <a:off x="91440" y="1690200"/>
-            <a:ext cx="822240" cy="777960"/>
+            <a:off x="7864920" y="6400800"/>
+            <a:ext cx="1004760" cy="261360"/>
           </a:xfrm>
           <a:prstGeom prst="rect">
             <a:avLst/>
           </a:prstGeom>
           <a:solidFill>
-            <a:srgbClr val="729fcf"/>
+            <a:srgbClr val="ff0000"/>
           </a:solidFill>
           <a:ln>
             <a:noFill/>
@@ -1842,68 +2642,159 @@
           <a:bodyPr lIns="90000" rIns="90000" tIns="45000" bIns="45000"/>
           <a:p>
             <a:r>
-              <a:rPr lang="en-US" sz="1200" strike="noStrike">
+              <a:rPr b="0" lang="en-US" sz="1200" spc="-1" strike="noStrike">
                 <a:solidFill>
                   <a:srgbClr val="000000"/>
                 </a:solidFill>
+                <a:uFill>
+                  <a:solidFill>
+                    <a:srgbClr val="ffffff"/>
+                  </a:solidFill>
+                </a:uFill>
+                <a:latin typeface="Arial"/>
+                <a:ea typeface="DejaVu Sans"/>
+              </a:rPr>
+              <a:t>5K BATCH</a:t>
+            </a:r>
+            <a:endParaRPr b="0" lang="en-US" sz="1200" spc="-1" strike="noStrike">
+              <a:solidFill>
+                <a:srgbClr val="000000"/>
+              </a:solidFill>
+              <a:uFill>
+                <a:solidFill>
+                  <a:srgbClr val="ffffff"/>
+                </a:solidFill>
+              </a:uFill>
+              <a:latin typeface="Arial"/>
+            </a:endParaRPr>
+          </a:p>
+        </p:txBody>
+      </p:sp>
+      <p:sp>
+        <p:nvSpPr>
+          <p:cNvPr id="50" name="CustomShape 10"/>
+          <p:cNvSpPr/>
+          <p:nvPr/>
+        </p:nvSpPr>
+        <p:spPr>
+          <a:xfrm>
+            <a:off x="1828800" y="548640"/>
+            <a:ext cx="1097280" cy="640080"/>
+          </a:xfrm>
+          <a:prstGeom prst="rect">
+            <a:avLst/>
+          </a:prstGeom>
+          <a:solidFill>
+            <a:srgbClr val="ff0000"/>
+          </a:solidFill>
+          <a:ln>
+            <a:noFill/>
+          </a:ln>
+        </p:spPr>
+        <p:style>
+          <a:lnRef idx="0"/>
+          <a:fillRef idx="0"/>
+          <a:effectRef idx="0"/>
+          <a:fontRef idx="minor"/>
+        </p:style>
+        <p:txBody>
+          <a:bodyPr lIns="90000" rIns="90000" tIns="45000" bIns="45000"/>
+          <a:p>
+            <a:r>
+              <a:rPr b="0" lang="en-US" sz="1200" spc="-1" strike="noStrike">
+                <a:solidFill>
+                  <a:srgbClr val="000000"/>
+                </a:solidFill>
+                <a:uFill>
+                  <a:solidFill>
+                    <a:srgbClr val="ffffff"/>
+                  </a:solidFill>
+                </a:uFill>
                 <a:latin typeface="Arial"/>
                 <a:ea typeface="DejaVu Sans"/>
               </a:rPr>
               <a:t>Initial </a:t>
             </a:r>
-            <a:endParaRPr/>
+            <a:endParaRPr b="0" lang="en-US" sz="1200" spc="-1" strike="noStrike">
+              <a:solidFill>
+                <a:srgbClr val="000000"/>
+              </a:solidFill>
+              <a:uFill>
+                <a:solidFill>
+                  <a:srgbClr val="ffffff"/>
+                </a:solidFill>
+              </a:uFill>
+              <a:latin typeface="Arial"/>
+            </a:endParaRPr>
           </a:p>
           <a:p>
             <a:r>
-              <a:rPr lang="en-US" sz="1200" strike="noStrike">
+              <a:rPr b="0" lang="en-US" sz="1200" spc="-1" strike="noStrike">
                 <a:solidFill>
                   <a:srgbClr val="000000"/>
                 </a:solidFill>
+                <a:uFill>
+                  <a:solidFill>
+                    <a:srgbClr val="ffffff"/>
+                  </a:solidFill>
+                </a:uFill>
                 <a:latin typeface="Arial"/>
                 <a:ea typeface="DejaVu Sans"/>
               </a:rPr>
-              <a:t>Queue </a:t>
+              <a:t>Backlog</a:t>
             </a:r>
-            <a:endParaRPr/>
+            <a:endParaRPr b="0" lang="en-US" sz="1200" spc="-1" strike="noStrike">
+              <a:solidFill>
+                <a:srgbClr val="000000"/>
+              </a:solidFill>
+              <a:uFill>
+                <a:solidFill>
+                  <a:srgbClr val="ffffff"/>
+                </a:solidFill>
+              </a:uFill>
+              <a:latin typeface="Arial"/>
+            </a:endParaRPr>
           </a:p>
           <a:p>
             <a:r>
-              <a:rPr lang="en-US" sz="1200" strike="noStrike">
+              <a:rPr b="0" lang="en-US" sz="1200" spc="-1" strike="noStrike">
                 <a:solidFill>
                   <a:srgbClr val="000000"/>
                 </a:solidFill>
+                <a:uFill>
+                  <a:solidFill>
+                    <a:srgbClr val="ffffff"/>
+                  </a:solidFill>
+                </a:uFill>
                 <a:latin typeface="Arial"/>
                 <a:ea typeface="DejaVu Sans"/>
               </a:rPr>
-              <a:t>Depth </a:t>
+              <a:t>153 K docs</a:t>
             </a:r>
-            <a:endParaRPr/>
-          </a:p>
-          <a:p>
-            <a:r>
-              <a:rPr lang="en-US" sz="1200" strike="noStrike">
-                <a:solidFill>
-                  <a:srgbClr val="000000"/>
-                </a:solidFill>
-                <a:latin typeface="Arial"/>
-                <a:ea typeface="DejaVu Sans"/>
-              </a:rPr>
-              <a:t>153 K</a:t>
-            </a:r>
-            <a:endParaRPr/>
-          </a:p>
-        </p:txBody>
-      </p:sp>
-      <p:sp>
-        <p:nvSpPr>
-          <p:cNvPr id="47" name="Line 11"/>
+            <a:endParaRPr b="0" lang="en-US" sz="1200" spc="-1" strike="noStrike">
+              <a:solidFill>
+                <a:srgbClr val="000000"/>
+              </a:solidFill>
+              <a:uFill>
+                <a:solidFill>
+                  <a:srgbClr val="ffffff"/>
+                </a:solidFill>
+              </a:uFill>
+              <a:latin typeface="Arial"/>
+            </a:endParaRPr>
+          </a:p>
+        </p:txBody>
+      </p:sp>
+      <p:sp>
+        <p:nvSpPr>
+          <p:cNvPr id="51" name="Line 11"/>
           <p:cNvSpPr/>
           <p:nvPr/>
         </p:nvSpPr>
         <p:spPr>
           <a:xfrm>
-            <a:off x="731520" y="4114800"/>
-            <a:ext cx="0" cy="3191760"/>
+            <a:off x="2102760" y="4297680"/>
+            <a:ext cx="360" cy="3191760"/>
           </a:xfrm>
           <a:prstGeom prst="line">
             <a:avLst/>
@@ -1916,17 +2807,23 @@
             <a:tailEnd len="med" type="diamond" w="med"/>
           </a:ln>
         </p:spPr>
-      </p:sp>
-      <p:sp>
-        <p:nvSpPr>
-          <p:cNvPr id="48" name="CustomShape 12"/>
+        <p:style>
+          <a:lnRef idx="0"/>
+          <a:fillRef idx="0"/>
+          <a:effectRef idx="0"/>
+          <a:fontRef idx="minor"/>
+        </p:style>
+      </p:sp>
+      <p:sp>
+        <p:nvSpPr>
+          <p:cNvPr id="52" name="CustomShape 12"/>
           <p:cNvSpPr/>
           <p:nvPr/>
         </p:nvSpPr>
         <p:spPr>
           <a:xfrm>
-            <a:off x="2103120" y="92880"/>
-            <a:ext cx="3108600" cy="1644120"/>
+            <a:off x="3017520" y="91440"/>
+            <a:ext cx="2834640" cy="1643760"/>
           </a:xfrm>
           <a:prstGeom prst="rect">
             <a:avLst/>
@@ -1948,183 +2845,323 @@
           <a:bodyPr lIns="90000" rIns="90000" tIns="45000" bIns="45000"/>
           <a:p>
             <a:r>
-              <a:rPr b="1" lang="en-US" sz="1400" strike="noStrike">
+              <a:rPr b="1" lang="en-US" sz="1400" spc="-1" strike="noStrike">
                 <a:solidFill>
                   <a:srgbClr val="000000"/>
                 </a:solidFill>
+                <a:uFill>
+                  <a:solidFill>
+                    <a:srgbClr val="ffffff"/>
+                  </a:solidFill>
+                </a:uFill>
                 <a:latin typeface="Arial"/>
                 <a:ea typeface="DejaVu Sans"/>
               </a:rPr>
               <a:t>Assumptions</a:t>
             </a:r>
             <a:r>
-              <a:rPr lang="en-US" sz="1400" strike="noStrike">
+              <a:rPr b="0" lang="en-US" sz="1400" spc="-1" strike="noStrike">
                 <a:solidFill>
                   <a:srgbClr val="000000"/>
                 </a:solidFill>
+                <a:uFill>
+                  <a:solidFill>
+                    <a:srgbClr val="ffffff"/>
+                  </a:solidFill>
+                </a:uFill>
                 <a:latin typeface="Arial"/>
                 <a:ea typeface="DejaVu Sans"/>
               </a:rPr>
               <a:t>:</a:t>
             </a:r>
-            <a:endParaRPr/>
+            <a:endParaRPr b="0" lang="en-US" sz="1400" spc="-1" strike="noStrike">
+              <a:solidFill>
+                <a:srgbClr val="000000"/>
+              </a:solidFill>
+              <a:uFill>
+                <a:solidFill>
+                  <a:srgbClr val="ffffff"/>
+                </a:solidFill>
+              </a:uFill>
+              <a:latin typeface="Arial"/>
+            </a:endParaRPr>
           </a:p>
           <a:p>
             <a:r>
-              <a:rPr lang="en-US" sz="1400" strike="noStrike">
+              <a:rPr b="0" lang="en-US" sz="1400" spc="-1" strike="noStrike">
                 <a:solidFill>
                   <a:srgbClr val="000000"/>
                 </a:solidFill>
+                <a:uFill>
+                  <a:solidFill>
+                    <a:srgbClr val="ffffff"/>
+                  </a:solidFill>
+                </a:uFill>
                 <a:latin typeface="Arial"/>
                 <a:ea typeface="DejaVu Sans"/>
               </a:rPr>
               <a:t>	</a:t>
             </a:r>
             <a:r>
-              <a:rPr lang="en-US" sz="1400" strike="noStrike">
+              <a:rPr b="0" lang="en-US" sz="1300" spc="-1" strike="noStrike">
                 <a:solidFill>
                   <a:srgbClr val="000000"/>
                 </a:solidFill>
+                <a:uFill>
+                  <a:solidFill>
+                    <a:srgbClr val="ffffff"/>
+                  </a:solidFill>
+                </a:uFill>
                 <a:latin typeface="Arial"/>
                 <a:ea typeface="DejaVu Sans"/>
               </a:rPr>
               <a:t>R/East supplies NLP engines</a:t>
             </a:r>
-            <a:endParaRPr/>
+            <a:endParaRPr b="0" lang="en-US" sz="1300" spc="-1" strike="noStrike">
+              <a:solidFill>
+                <a:srgbClr val="000000"/>
+              </a:solidFill>
+              <a:uFill>
+                <a:solidFill>
+                  <a:srgbClr val="ffffff"/>
+                </a:solidFill>
+              </a:uFill>
+              <a:latin typeface="Arial"/>
+            </a:endParaRPr>
           </a:p>
           <a:p>
             <a:r>
-              <a:rPr lang="en-US" sz="1400" strike="noStrike">
+              <a:rPr b="0" lang="en-US" sz="1300" spc="-1" strike="noStrike">
                 <a:solidFill>
                   <a:srgbClr val="000000"/>
                 </a:solidFill>
+                <a:uFill>
+                  <a:solidFill>
+                    <a:srgbClr val="ffffff"/>
+                  </a:solidFill>
+                </a:uFill>
                 <a:latin typeface="Arial"/>
                 <a:ea typeface="DejaVu Sans"/>
               </a:rPr>
               <a:t>	</a:t>
             </a:r>
             <a:r>
-              <a:rPr lang="en-US" sz="1400" strike="noStrike">
+              <a:rPr b="0" lang="en-US" sz="1300" spc="-1" strike="noStrike">
                 <a:solidFill>
                   <a:srgbClr val="000000"/>
                 </a:solidFill>
+                <a:uFill>
+                  <a:solidFill>
+                    <a:srgbClr val="ffffff"/>
+                  </a:solidFill>
+                </a:uFill>
                 <a:latin typeface="Arial"/>
                 <a:ea typeface="DejaVu Sans"/>
               </a:rPr>
               <a:t>2019 dollars</a:t>
             </a:r>
-            <a:endParaRPr/>
+            <a:endParaRPr b="0" lang="en-US" sz="1300" spc="-1" strike="noStrike">
+              <a:solidFill>
+                <a:srgbClr val="000000"/>
+              </a:solidFill>
+              <a:uFill>
+                <a:solidFill>
+                  <a:srgbClr val="ffffff"/>
+                </a:solidFill>
+              </a:uFill>
+              <a:latin typeface="Arial"/>
+            </a:endParaRPr>
           </a:p>
           <a:p>
             <a:r>
-              <a:rPr lang="en-US" sz="1400" strike="noStrike">
+              <a:rPr b="0" lang="en-US" sz="1300" spc="-1" strike="noStrike">
                 <a:solidFill>
                   <a:srgbClr val="000000"/>
                 </a:solidFill>
+                <a:uFill>
+                  <a:solidFill>
+                    <a:srgbClr val="ffffff"/>
+                  </a:solidFill>
+                </a:uFill>
                 <a:latin typeface="Arial"/>
                 <a:ea typeface="DejaVu Sans"/>
               </a:rPr>
               <a:t>	</a:t>
             </a:r>
             <a:r>
-              <a:rPr lang="en-US" sz="1400" strike="noStrike">
+              <a:rPr b="0" lang="en-US" sz="1300" spc="-1" strike="noStrike">
                 <a:solidFill>
                   <a:srgbClr val="000000"/>
                 </a:solidFill>
+                <a:uFill>
+                  <a:solidFill>
+                    <a:srgbClr val="ffffff"/>
+                  </a:solidFill>
+                </a:uFill>
                 <a:latin typeface="Arial"/>
                 <a:ea typeface="DejaVu Sans"/>
               </a:rPr>
-              <a:t>NRE 2 FTEs in-sourced</a:t>
+              <a:t>2 FTEs in-sourced</a:t>
             </a:r>
-            <a:endParaRPr/>
+            <a:endParaRPr b="0" lang="en-US" sz="1300" spc="-1" strike="noStrike">
+              <a:solidFill>
+                <a:srgbClr val="000000"/>
+              </a:solidFill>
+              <a:uFill>
+                <a:solidFill>
+                  <a:srgbClr val="ffffff"/>
+                </a:solidFill>
+              </a:uFill>
+              <a:latin typeface="Arial"/>
+            </a:endParaRPr>
           </a:p>
           <a:p>
             <a:r>
-              <a:rPr lang="en-US" sz="1400" strike="noStrike">
+              <a:rPr b="0" lang="en-US" sz="1300" spc="-1" strike="noStrike">
                 <a:solidFill>
                   <a:srgbClr val="000000"/>
                 </a:solidFill>
+                <a:uFill>
+                  <a:solidFill>
+                    <a:srgbClr val="ffffff"/>
+                  </a:solidFill>
+                </a:uFill>
                 <a:latin typeface="Arial"/>
                 <a:ea typeface="DejaVu Sans"/>
               </a:rPr>
               <a:t>	</a:t>
             </a:r>
             <a:r>
-              <a:rPr lang="en-US" sz="1400" strike="noStrike">
+              <a:rPr b="0" lang="en-US" sz="1300" spc="-1" strike="noStrike">
                 <a:solidFill>
                   <a:srgbClr val="000000"/>
                 </a:solidFill>
+                <a:uFill>
+                  <a:solidFill>
+                    <a:srgbClr val="ffffff"/>
+                  </a:solidFill>
+                </a:uFill>
                 <a:latin typeface="Arial"/>
                 <a:ea typeface="DejaVu Sans"/>
               </a:rPr>
-              <a:t>5.1 K docs/yr</a:t>
+              <a:t>5.1 K docs/yr constant</a:t>
             </a:r>
-            <a:endParaRPr/>
+            <a:endParaRPr b="0" lang="en-US" sz="1300" spc="-1" strike="noStrike">
+              <a:solidFill>
+                <a:srgbClr val="000000"/>
+              </a:solidFill>
+              <a:uFill>
+                <a:solidFill>
+                  <a:srgbClr val="ffffff"/>
+                </a:solidFill>
+              </a:uFill>
+              <a:latin typeface="Arial"/>
+            </a:endParaRPr>
           </a:p>
           <a:p>
             <a:r>
-              <a:rPr lang="en-US" sz="1400" strike="noStrike">
+              <a:rPr b="0" lang="en-US" sz="1300" spc="-1" strike="noStrike">
                 <a:solidFill>
                   <a:srgbClr val="000000"/>
                 </a:solidFill>
+                <a:uFill>
+                  <a:solidFill>
+                    <a:srgbClr val="ffffff"/>
+                  </a:solidFill>
+                </a:uFill>
                 <a:latin typeface="Arial"/>
                 <a:ea typeface="DejaVu Sans"/>
               </a:rPr>
               <a:t>	</a:t>
             </a:r>
             <a:r>
-              <a:rPr lang="en-US" sz="1400" strike="noStrike">
+              <a:rPr b="0" lang="en-US" sz="1300" spc="-1" strike="noStrike">
                 <a:solidFill>
                   <a:srgbClr val="000000"/>
                 </a:solidFill>
+                <a:uFill>
+                  <a:solidFill>
+                    <a:srgbClr val="ffffff"/>
+                  </a:solidFill>
+                </a:uFill>
                 <a:latin typeface="Arial"/>
                 <a:ea typeface="DejaVu Sans"/>
               </a:rPr>
-              <a:t>Dockerized Vms</a:t>
+              <a:t>10 dockerized VMs</a:t>
             </a:r>
-            <a:endParaRPr/>
+            <a:endParaRPr b="0" lang="en-US" sz="1300" spc="-1" strike="noStrike">
+              <a:solidFill>
+                <a:srgbClr val="000000"/>
+              </a:solidFill>
+              <a:uFill>
+                <a:solidFill>
+                  <a:srgbClr val="ffffff"/>
+                </a:solidFill>
+              </a:uFill>
+              <a:latin typeface="Arial"/>
+            </a:endParaRPr>
           </a:p>
           <a:p>
             <a:r>
-              <a:rPr lang="en-US" sz="1400" strike="noStrike">
+              <a:rPr b="0" lang="en-US" sz="1300" spc="-1" strike="noStrike">
                 <a:solidFill>
                   <a:srgbClr val="000000"/>
                 </a:solidFill>
+                <a:uFill>
+                  <a:solidFill>
+                    <a:srgbClr val="ffffff"/>
+                  </a:solidFill>
+                </a:uFill>
                 <a:latin typeface="Arial"/>
                 <a:ea typeface="DejaVu Sans"/>
               </a:rPr>
               <a:t>	</a:t>
             </a:r>
             <a:r>
-              <a:rPr lang="en-US" sz="1400" strike="noStrike">
+              <a:rPr b="0" lang="en-US" sz="1300" spc="-1" strike="noStrike">
                 <a:solidFill>
                   <a:srgbClr val="000000"/>
                 </a:solidFill>
+                <a:uFill>
+                  <a:solidFill>
+                    <a:srgbClr val="ffffff"/>
+                  </a:solidFill>
+                </a:uFill>
                 <a:latin typeface="Arial"/>
                 <a:ea typeface="DejaVu Sans"/>
               </a:rPr>
               <a:t>10% of docs labelled</a:t>
             </a:r>
-            <a:endParaRPr/>
-          </a:p>
-        </p:txBody>
-      </p:sp>
-      <p:sp>
-        <p:nvSpPr>
-          <p:cNvPr id="49" name="CustomShape 13"/>
+            <a:endParaRPr b="0" lang="en-US" sz="1300" spc="-1" strike="noStrike">
+              <a:solidFill>
+                <a:srgbClr val="000000"/>
+              </a:solidFill>
+              <a:uFill>
+                <a:solidFill>
+                  <a:srgbClr val="ffffff"/>
+                </a:solidFill>
+              </a:uFill>
+              <a:latin typeface="Arial"/>
+            </a:endParaRPr>
+          </a:p>
+        </p:txBody>
+      </p:sp>
+      <p:sp>
+        <p:nvSpPr>
+          <p:cNvPr id="53" name="CustomShape 13"/>
           <p:cNvSpPr/>
           <p:nvPr/>
         </p:nvSpPr>
         <p:spPr>
           <a:xfrm>
-            <a:off x="8778240" y="3131640"/>
-            <a:ext cx="913680" cy="433800"/>
+            <a:off x="7682040" y="365760"/>
+            <a:ext cx="913320" cy="433440"/>
           </a:xfrm>
           <a:prstGeom prst="rect">
             <a:avLst/>
           </a:prstGeom>
           <a:solidFill>
-            <a:srgbClr val="729fcf"/>
+            <a:srgbClr val="000000"/>
           </a:solidFill>
           <a:ln>
             <a:noFill/>
@@ -2140,42 +3177,72 @@
           <a:bodyPr lIns="90000" rIns="90000" tIns="45000" bIns="45000"/>
           <a:p>
             <a:r>
-              <a:rPr lang="en-US" sz="1200" strike="noStrike">
+              <a:rPr b="0" lang="en-US" sz="1200" spc="-1" strike="noStrike">
                 <a:solidFill>
                   <a:srgbClr val="000000"/>
                 </a:solidFill>
+                <a:uFill>
+                  <a:solidFill>
+                    <a:srgbClr val="ffffff"/>
+                  </a:solidFill>
+                </a:uFill>
                 <a:latin typeface="Arial"/>
                 <a:ea typeface="DejaVu Sans"/>
               </a:rPr>
               <a:t>DOC ACQ</a:t>
             </a:r>
-            <a:endParaRPr/>
+            <a:endParaRPr b="0" lang="en-US" sz="1200" spc="-1" strike="noStrike">
+              <a:solidFill>
+                <a:srgbClr val="000000"/>
+              </a:solidFill>
+              <a:uFill>
+                <a:solidFill>
+                  <a:srgbClr val="ffffff"/>
+                </a:solidFill>
+              </a:uFill>
+              <a:latin typeface="Arial"/>
+            </a:endParaRPr>
           </a:p>
           <a:p>
             <a:r>
-              <a:rPr lang="en-US" sz="1200" strike="noStrike">
+              <a:rPr b="0" lang="en-US" sz="1200" spc="-1" strike="noStrike">
                 <a:solidFill>
                   <a:srgbClr val="000000"/>
                 </a:solidFill>
+                <a:uFill>
+                  <a:solidFill>
+                    <a:srgbClr val="ffffff"/>
+                  </a:solidFill>
+                </a:uFill>
                 <a:latin typeface="Arial"/>
                 <a:ea typeface="DejaVu Sans"/>
               </a:rPr>
-              <a:t>51  M$</a:t>
+              <a:t>51  M $</a:t>
             </a:r>
-            <a:endParaRPr/>
-          </a:p>
-        </p:txBody>
-      </p:sp>
-      <p:sp>
-        <p:nvSpPr>
-          <p:cNvPr id="50" name="CustomShape 14"/>
+            <a:endParaRPr b="0" lang="en-US" sz="1200" spc="-1" strike="noStrike">
+              <a:solidFill>
+                <a:srgbClr val="000000"/>
+              </a:solidFill>
+              <a:uFill>
+                <a:solidFill>
+                  <a:srgbClr val="ffffff"/>
+                </a:solidFill>
+              </a:uFill>
+              <a:latin typeface="Arial"/>
+            </a:endParaRPr>
+          </a:p>
+        </p:txBody>
+      </p:sp>
+      <p:sp>
+        <p:nvSpPr>
+          <p:cNvPr id="54" name="CustomShape 14"/>
           <p:cNvSpPr/>
           <p:nvPr/>
         </p:nvSpPr>
         <p:spPr>
           <a:xfrm>
-            <a:off x="8869680" y="3881160"/>
-            <a:ext cx="491040" cy="232920"/>
+            <a:off x="7589520" y="3749040"/>
+            <a:ext cx="490680" cy="232560"/>
           </a:xfrm>
           <a:prstGeom prst="rect">
             <a:avLst/>
@@ -2195,57 +3262,53 @@
           <a:bodyPr lIns="90000" rIns="90000" tIns="45000" bIns="45000"/>
           <a:p>
             <a:r>
-              <a:rPr lang="en-US" sz="1000" strike="noStrike">
+              <a:rPr b="0" lang="en-US" sz="1000" spc="-1" strike="noStrike">
                 <a:solidFill>
                   <a:srgbClr val="000000"/>
                 </a:solidFill>
+                <a:uFill>
+                  <a:solidFill>
+                    <a:srgbClr val="ffffff"/>
+                  </a:solidFill>
+                </a:uFill>
                 <a:latin typeface="Arial"/>
                 <a:ea typeface="DejaVu Sans"/>
               </a:rPr>
               <a:t>years</a:t>
             </a:r>
-            <a:endParaRPr/>
-          </a:p>
-        </p:txBody>
-      </p:sp>
-      <p:sp>
-        <p:nvSpPr>
-          <p:cNvPr id="51" name="Line 15"/>
+            <a:endParaRPr b="0" lang="en-US" sz="1000" spc="-1" strike="noStrike">
+              <a:solidFill>
+                <a:srgbClr val="000000"/>
+              </a:solidFill>
+              <a:uFill>
+                <a:solidFill>
+                  <a:srgbClr val="ffffff"/>
+                </a:solidFill>
+              </a:uFill>
+              <a:latin typeface="Arial"/>
+            </a:endParaRPr>
+          </a:p>
+        </p:txBody>
+      </p:sp>
+      <p:sp>
+        <p:nvSpPr>
+          <p:cNvPr id="55" name="Line 15"/>
           <p:cNvSpPr/>
           <p:nvPr/>
         </p:nvSpPr>
         <p:spPr>
           <a:xfrm>
-            <a:off x="822960" y="6035040"/>
-            <a:ext cx="8503920" cy="0"/>
+            <a:off x="1920240" y="6750000"/>
+            <a:ext cx="7132320" cy="0"/>
           </a:xfrm>
           <a:prstGeom prst="line">
             <a:avLst/>
           </a:prstGeom>
-          <a:ln>
+          <a:ln w="36720">
             <a:solidFill>
               <a:srgbClr val="ff3333"/>
             </a:solidFill>
-          </a:ln>
-        </p:spPr>
-      </p:sp>
-      <p:sp>
-        <p:nvSpPr>
-          <p:cNvPr id="52" name="CustomShape 16"/>
-          <p:cNvSpPr/>
-          <p:nvPr/>
-        </p:nvSpPr>
-        <p:spPr>
-          <a:xfrm>
-            <a:off x="0" y="3881520"/>
-            <a:ext cx="491040" cy="232920"/>
-          </a:xfrm>
-          <a:prstGeom prst="rect">
-            <a:avLst/>
-          </a:prstGeom>
-          <a:noFill/>
-          <a:ln>
-            <a:noFill/>
+            <a:round/>
           </a:ln>
         </p:spPr>
         <p:style>
@@ -2254,33 +3317,17 @@
           <a:effectRef idx="0"/>
           <a:fontRef idx="minor"/>
         </p:style>
-        <p:txBody>
-          <a:bodyPr lIns="90000" rIns="90000" tIns="45000" bIns="45000"/>
-          <a:p>
-            <a:r>
-              <a:rPr lang="en-US" sz="1000" strike="noStrike">
-                <a:solidFill>
-                  <a:srgbClr val="000000"/>
-                </a:solidFill>
-                <a:latin typeface="Arial"/>
-                <a:ea typeface="DejaVu Sans"/>
-              </a:rPr>
-              <a:t>-2</a:t>
-            </a:r>
-            <a:endParaRPr/>
-          </a:p>
-        </p:txBody>
-      </p:sp>
-      <p:sp>
-        <p:nvSpPr>
-          <p:cNvPr id="53" name="CustomShape 17"/>
+      </p:sp>
+      <p:sp>
+        <p:nvSpPr>
+          <p:cNvPr id="56" name="CustomShape 16"/>
           <p:cNvSpPr/>
           <p:nvPr/>
         </p:nvSpPr>
         <p:spPr>
           <a:xfrm>
-            <a:off x="365760" y="6750000"/>
-            <a:ext cx="1462320" cy="381960"/>
+            <a:off x="1096920" y="7025040"/>
+            <a:ext cx="1461960" cy="381600"/>
           </a:xfrm>
           <a:prstGeom prst="rect">
             <a:avLst/>
@@ -2300,29 +3347,44 @@
           <a:bodyPr lIns="90000" rIns="90000" tIns="45000" bIns="45000"/>
           <a:p>
             <a:r>
-              <a:rPr lang="en-US" strike="noStrike">
-                <a:solidFill>
-                  <a:srgbClr val="ffffff"/>
-                </a:solidFill>
+              <a:rPr b="0" lang="en-US" sz="1800" spc="-1" strike="noStrike">
+                <a:solidFill>
+                  <a:srgbClr val="ffffff"/>
+                </a:solidFill>
+                <a:uFill>
+                  <a:solidFill>
+                    <a:srgbClr val="ffffff"/>
+                  </a:solidFill>
+                </a:uFill>
                 <a:latin typeface="Arial"/>
                 <a:ea typeface="DejaVu Sans"/>
               </a:rPr>
               <a:t>research</a:t>
             </a:r>
-            <a:endParaRPr/>
-          </a:p>
-        </p:txBody>
-      </p:sp>
-      <p:sp>
-        <p:nvSpPr>
-          <p:cNvPr id="54" name="CustomShape 18"/>
+            <a:endParaRPr b="0" lang="en-US" sz="1800" spc="-1" strike="noStrike">
+              <a:solidFill>
+                <a:srgbClr val="000000"/>
+              </a:solidFill>
+              <a:uFill>
+                <a:solidFill>
+                  <a:srgbClr val="ffffff"/>
+                </a:solidFill>
+              </a:uFill>
+              <a:latin typeface="Arial"/>
+            </a:endParaRPr>
+          </a:p>
+        </p:txBody>
+      </p:sp>
+      <p:sp>
+        <p:nvSpPr>
+          <p:cNvPr id="57" name="CustomShape 17"/>
           <p:cNvSpPr/>
           <p:nvPr/>
         </p:nvSpPr>
         <p:spPr>
           <a:xfrm>
-            <a:off x="4663440" y="6704280"/>
-            <a:ext cx="1462320" cy="381960"/>
+            <a:off x="5121720" y="7178040"/>
+            <a:ext cx="1461960" cy="381600"/>
           </a:xfrm>
           <a:prstGeom prst="rect">
             <a:avLst/>
@@ -2342,16 +3404,522 @@
           <a:bodyPr lIns="90000" rIns="90000" tIns="45000" bIns="45000"/>
           <a:p>
             <a:r>
-              <a:rPr lang="en-US" strike="noStrike">
-                <a:solidFill>
-                  <a:srgbClr val="ffffff"/>
-                </a:solidFill>
+              <a:rPr b="0" lang="en-US" sz="1800" spc="-1" strike="noStrike">
+                <a:solidFill>
+                  <a:srgbClr val="ffffff"/>
+                </a:solidFill>
+                <a:uFill>
+                  <a:solidFill>
+                    <a:srgbClr val="ffffff"/>
+                  </a:solidFill>
+                </a:uFill>
                 <a:latin typeface="Arial"/>
                 <a:ea typeface="DejaVu Sans"/>
               </a:rPr>
               <a:t>operation</a:t>
             </a:r>
-            <a:endParaRPr/>
+            <a:endParaRPr b="0" lang="en-US" sz="1800" spc="-1" strike="noStrike">
+              <a:solidFill>
+                <a:srgbClr val="000000"/>
+              </a:solidFill>
+              <a:uFill>
+                <a:solidFill>
+                  <a:srgbClr val="ffffff"/>
+                </a:solidFill>
+              </a:uFill>
+              <a:latin typeface="Arial"/>
+            </a:endParaRPr>
+          </a:p>
+        </p:txBody>
+      </p:sp>
+      <p:sp>
+        <p:nvSpPr>
+          <p:cNvPr id="58" name="CustomShape 18"/>
+          <p:cNvSpPr/>
+          <p:nvPr/>
+        </p:nvSpPr>
+        <p:spPr>
+          <a:xfrm rot="5219400">
+            <a:off x="8003520" y="968400"/>
+            <a:ext cx="1650240" cy="630000"/>
+          </a:xfrm>
+          <a:custGeom>
+            <a:avLst/>
+            <a:gdLst/>
+            <a:ahLst/>
+            <a:rect l="0" t="0" r="r" b="b"/>
+            <a:pathLst>
+              <a:path w="5160" h="1310">
+                <a:moveTo>
+                  <a:pt x="3459" y="875"/>
+                </a:moveTo>
+                <a:lnTo>
+                  <a:pt x="3458" y="852"/>
+                </a:lnTo>
+                <a:lnTo>
+                  <a:pt x="3454" y="830"/>
+                </a:lnTo>
+                <a:lnTo>
+                  <a:pt x="3447" y="807"/>
+                </a:lnTo>
+                <a:lnTo>
+                  <a:pt x="3436" y="785"/>
+                </a:lnTo>
+                <a:lnTo>
+                  <a:pt x="3423" y="763"/>
+                </a:lnTo>
+                <a:lnTo>
+                  <a:pt x="3405" y="741"/>
+                </a:lnTo>
+                <a:lnTo>
+                  <a:pt x="3386" y="720"/>
+                </a:lnTo>
+                <a:lnTo>
+                  <a:pt x="3364" y="699"/>
+                </a:lnTo>
+                <a:lnTo>
+                  <a:pt x="3340" y="679"/>
+                </a:lnTo>
+                <a:lnTo>
+                  <a:pt x="3312" y="659"/>
+                </a:lnTo>
+                <a:lnTo>
+                  <a:pt x="3282" y="639"/>
+                </a:lnTo>
+                <a:lnTo>
+                  <a:pt x="3250" y="620"/>
+                </a:lnTo>
+                <a:lnTo>
+                  <a:pt x="3215" y="602"/>
+                </a:lnTo>
+                <a:lnTo>
+                  <a:pt x="3177" y="584"/>
+                </a:lnTo>
+                <a:lnTo>
+                  <a:pt x="3139" y="568"/>
+                </a:lnTo>
+                <a:lnTo>
+                  <a:pt x="3097" y="552"/>
+                </a:lnTo>
+                <a:lnTo>
+                  <a:pt x="3052" y="538"/>
+                </a:lnTo>
+                <a:lnTo>
+                  <a:pt x="3006" y="522"/>
+                </a:lnTo>
+                <a:lnTo>
+                  <a:pt x="2960" y="509"/>
+                </a:lnTo>
+                <a:lnTo>
+                  <a:pt x="2909" y="497"/>
+                </a:lnTo>
+                <a:lnTo>
+                  <a:pt x="2859" y="485"/>
+                </a:lnTo>
+                <a:lnTo>
+                  <a:pt x="2806" y="476"/>
+                </a:lnTo>
+                <a:lnTo>
+                  <a:pt x="2753" y="465"/>
+                </a:lnTo>
+                <a:lnTo>
+                  <a:pt x="2697" y="457"/>
+                </a:lnTo>
+                <a:lnTo>
+                  <a:pt x="2641" y="449"/>
+                </a:lnTo>
+                <a:lnTo>
+                  <a:pt x="2586" y="443"/>
+                </a:lnTo>
+                <a:lnTo>
+                  <a:pt x="2528" y="438"/>
+                </a:lnTo>
+                <a:lnTo>
+                  <a:pt x="2470" y="434"/>
+                </a:lnTo>
+                <a:lnTo>
+                  <a:pt x="2411" y="431"/>
+                </a:lnTo>
+                <a:lnTo>
+                  <a:pt x="2352" y="431"/>
+                </a:lnTo>
+                <a:lnTo>
+                  <a:pt x="2293" y="430"/>
+                </a:lnTo>
+                <a:lnTo>
+                  <a:pt x="2234" y="431"/>
+                </a:lnTo>
+                <a:lnTo>
+                  <a:pt x="2175" y="431"/>
+                </a:lnTo>
+                <a:lnTo>
+                  <a:pt x="2115" y="434"/>
+                </a:lnTo>
+                <a:lnTo>
+                  <a:pt x="2057" y="438"/>
+                </a:lnTo>
+                <a:lnTo>
+                  <a:pt x="2000" y="443"/>
+                </a:lnTo>
+                <a:lnTo>
+                  <a:pt x="1943" y="449"/>
+                </a:lnTo>
+                <a:lnTo>
+                  <a:pt x="1888" y="457"/>
+                </a:lnTo>
+                <a:lnTo>
+                  <a:pt x="1832" y="466"/>
+                </a:lnTo>
+                <a:lnTo>
+                  <a:pt x="1779" y="476"/>
+                </a:lnTo>
+                <a:lnTo>
+                  <a:pt x="1726" y="485"/>
+                </a:lnTo>
+                <a:lnTo>
+                  <a:pt x="1676" y="497"/>
+                </a:lnTo>
+                <a:lnTo>
+                  <a:pt x="1626" y="510"/>
+                </a:lnTo>
+                <a:lnTo>
+                  <a:pt x="1578" y="522"/>
+                </a:lnTo>
+                <a:lnTo>
+                  <a:pt x="1532" y="537"/>
+                </a:lnTo>
+                <a:lnTo>
+                  <a:pt x="1488" y="553"/>
+                </a:lnTo>
+                <a:lnTo>
+                  <a:pt x="1446" y="569"/>
+                </a:lnTo>
+                <a:lnTo>
+                  <a:pt x="1408" y="585"/>
+                </a:lnTo>
+                <a:lnTo>
+                  <a:pt x="1370" y="603"/>
+                </a:lnTo>
+                <a:lnTo>
+                  <a:pt x="1335" y="621"/>
+                </a:lnTo>
+                <a:lnTo>
+                  <a:pt x="1303" y="639"/>
+                </a:lnTo>
+                <a:lnTo>
+                  <a:pt x="1272" y="660"/>
+                </a:lnTo>
+                <a:lnTo>
+                  <a:pt x="1244" y="679"/>
+                </a:lnTo>
+                <a:lnTo>
+                  <a:pt x="1220" y="700"/>
+                </a:lnTo>
+                <a:lnTo>
+                  <a:pt x="1198" y="721"/>
+                </a:lnTo>
+                <a:lnTo>
+                  <a:pt x="1179" y="742"/>
+                </a:lnTo>
+                <a:lnTo>
+                  <a:pt x="1163" y="763"/>
+                </a:lnTo>
+                <a:lnTo>
+                  <a:pt x="1150" y="785"/>
+                </a:lnTo>
+                <a:lnTo>
+                  <a:pt x="1139" y="808"/>
+                </a:lnTo>
+                <a:lnTo>
+                  <a:pt x="1131" y="830"/>
+                </a:lnTo>
+                <a:lnTo>
+                  <a:pt x="1126" y="852"/>
+                </a:lnTo>
+                <a:lnTo>
+                  <a:pt x="1126" y="875"/>
+                </a:lnTo>
+                <a:lnTo>
+                  <a:pt x="0" y="875"/>
+                </a:lnTo>
+                <a:lnTo>
+                  <a:pt x="4" y="831"/>
+                </a:lnTo>
+                <a:lnTo>
+                  <a:pt x="12" y="787"/>
+                </a:lnTo>
+                <a:lnTo>
+                  <a:pt x="26" y="743"/>
+                </a:lnTo>
+                <a:lnTo>
+                  <a:pt x="48" y="700"/>
+                </a:lnTo>
+                <a:lnTo>
+                  <a:pt x="74" y="657"/>
+                </a:lnTo>
+                <a:lnTo>
+                  <a:pt x="105" y="613"/>
+                </a:lnTo>
+                <a:lnTo>
+                  <a:pt x="144" y="571"/>
+                </a:lnTo>
+                <a:lnTo>
+                  <a:pt x="187" y="531"/>
+                </a:lnTo>
+                <a:lnTo>
+                  <a:pt x="235" y="491"/>
+                </a:lnTo>
+                <a:lnTo>
+                  <a:pt x="288" y="451"/>
+                </a:lnTo>
+                <a:lnTo>
+                  <a:pt x="347" y="413"/>
+                </a:lnTo>
+                <a:lnTo>
+                  <a:pt x="411" y="375"/>
+                </a:lnTo>
+                <a:lnTo>
+                  <a:pt x="480" y="340"/>
+                </a:lnTo>
+                <a:lnTo>
+                  <a:pt x="553" y="305"/>
+                </a:lnTo>
+                <a:lnTo>
+                  <a:pt x="632" y="272"/>
+                </a:lnTo>
+                <a:lnTo>
+                  <a:pt x="714" y="242"/>
+                </a:lnTo>
+                <a:lnTo>
+                  <a:pt x="799" y="211"/>
+                </a:lnTo>
+                <a:lnTo>
+                  <a:pt x="890" y="184"/>
+                </a:lnTo>
+                <a:lnTo>
+                  <a:pt x="983" y="158"/>
+                </a:lnTo>
+                <a:lnTo>
+                  <a:pt x="1081" y="133"/>
+                </a:lnTo>
+                <a:lnTo>
+                  <a:pt x="1180" y="110"/>
+                </a:lnTo>
+                <a:lnTo>
+                  <a:pt x="1283" y="89"/>
+                </a:lnTo>
+                <a:lnTo>
+                  <a:pt x="1388" y="72"/>
+                </a:lnTo>
+                <a:lnTo>
+                  <a:pt x="1496" y="54"/>
+                </a:lnTo>
+                <a:lnTo>
+                  <a:pt x="1606" y="40"/>
+                </a:lnTo>
+                <a:lnTo>
+                  <a:pt x="1718" y="28"/>
+                </a:lnTo>
+                <a:lnTo>
+                  <a:pt x="1832" y="18"/>
+                </a:lnTo>
+                <a:lnTo>
+                  <a:pt x="1945" y="10"/>
+                </a:lnTo>
+                <a:lnTo>
+                  <a:pt x="2061" y="4"/>
+                </a:lnTo>
+                <a:lnTo>
+                  <a:pt x="2176" y="1"/>
+                </a:lnTo>
+                <a:lnTo>
+                  <a:pt x="2292" y="0"/>
+                </a:lnTo>
+                <a:lnTo>
+                  <a:pt x="2409" y="1"/>
+                </a:lnTo>
+                <a:lnTo>
+                  <a:pt x="2525" y="4"/>
+                </a:lnTo>
+                <a:lnTo>
+                  <a:pt x="2639" y="10"/>
+                </a:lnTo>
+                <a:lnTo>
+                  <a:pt x="2753" y="18"/>
+                </a:lnTo>
+                <a:lnTo>
+                  <a:pt x="2867" y="28"/>
+                </a:lnTo>
+                <a:lnTo>
+                  <a:pt x="2978" y="40"/>
+                </a:lnTo>
+                <a:lnTo>
+                  <a:pt x="3089" y="54"/>
+                </a:lnTo>
+                <a:lnTo>
+                  <a:pt x="3197" y="71"/>
+                </a:lnTo>
+                <a:lnTo>
+                  <a:pt x="3301" y="89"/>
+                </a:lnTo>
+                <a:lnTo>
+                  <a:pt x="3404" y="110"/>
+                </a:lnTo>
+                <a:lnTo>
+                  <a:pt x="3504" y="132"/>
+                </a:lnTo>
+                <a:lnTo>
+                  <a:pt x="3601" y="157"/>
+                </a:lnTo>
+                <a:lnTo>
+                  <a:pt x="3696" y="183"/>
+                </a:lnTo>
+                <a:lnTo>
+                  <a:pt x="3785" y="211"/>
+                </a:lnTo>
+                <a:lnTo>
+                  <a:pt x="3872" y="241"/>
+                </a:lnTo>
+                <a:lnTo>
+                  <a:pt x="3953" y="272"/>
+                </a:lnTo>
+                <a:lnTo>
+                  <a:pt x="4032" y="304"/>
+                </a:lnTo>
+                <a:lnTo>
+                  <a:pt x="4104" y="339"/>
+                </a:lnTo>
+                <a:lnTo>
+                  <a:pt x="4173" y="375"/>
+                </a:lnTo>
+                <a:lnTo>
+                  <a:pt x="4237" y="412"/>
+                </a:lnTo>
+                <a:lnTo>
+                  <a:pt x="4297" y="450"/>
+                </a:lnTo>
+                <a:lnTo>
+                  <a:pt x="4351" y="489"/>
+                </a:lnTo>
+                <a:lnTo>
+                  <a:pt x="4399" y="530"/>
+                </a:lnTo>
+                <a:lnTo>
+                  <a:pt x="4441" y="571"/>
+                </a:lnTo>
+                <a:lnTo>
+                  <a:pt x="4479" y="613"/>
+                </a:lnTo>
+                <a:lnTo>
+                  <a:pt x="4511" y="656"/>
+                </a:lnTo>
+                <a:lnTo>
+                  <a:pt x="4538" y="699"/>
+                </a:lnTo>
+                <a:lnTo>
+                  <a:pt x="4559" y="743"/>
+                </a:lnTo>
+                <a:lnTo>
+                  <a:pt x="4572" y="785"/>
+                </a:lnTo>
+                <a:lnTo>
+                  <a:pt x="4582" y="831"/>
+                </a:lnTo>
+                <a:lnTo>
+                  <a:pt x="4585" y="875"/>
+                </a:lnTo>
+                <a:lnTo>
+                  <a:pt x="5159" y="875"/>
+                </a:lnTo>
+                <a:lnTo>
+                  <a:pt x="4022" y="1309"/>
+                </a:lnTo>
+                <a:lnTo>
+                  <a:pt x="2886" y="875"/>
+                </a:lnTo>
+                <a:lnTo>
+                  <a:pt x="3459" y="875"/>
+                </a:lnTo>
+              </a:path>
+            </a:pathLst>
+          </a:custGeom>
+          <a:solidFill>
+            <a:srgbClr val="729fcf"/>
+          </a:solidFill>
+          <a:ln>
+            <a:solidFill>
+              <a:srgbClr val="3465a4"/>
+            </a:solidFill>
+          </a:ln>
+        </p:spPr>
+        <p:style>
+          <a:lnRef idx="0"/>
+          <a:fillRef idx="0"/>
+          <a:effectRef idx="0"/>
+          <a:fontRef idx="minor"/>
+        </p:style>
+      </p:sp>
+      <p:sp>
+        <p:nvSpPr>
+          <p:cNvPr id="59" name="TextShape 19"/>
+          <p:cNvSpPr txBox="1"/>
+          <p:nvPr/>
+        </p:nvSpPr>
+        <p:spPr>
+          <a:xfrm>
+            <a:off x="9074880" y="171000"/>
+            <a:ext cx="1005840" cy="651960"/>
+          </a:xfrm>
+          <a:prstGeom prst="rect">
+            <a:avLst/>
+          </a:prstGeom>
+          <a:noFill/>
+          <a:ln>
+            <a:noFill/>
+          </a:ln>
+        </p:spPr>
+        <p:txBody>
+          <a:bodyPr lIns="90000" rIns="90000" tIns="45000" bIns="45000"/>
+          <a:p>
+            <a:r>
+              <a:rPr b="0" lang="en-US" sz="1000" spc="-1" strike="noStrike">
+                <a:solidFill>
+                  <a:srgbClr val="000000"/>
+                </a:solidFill>
+                <a:uFill>
+                  <a:solidFill>
+                    <a:srgbClr val="ffffff"/>
+                  </a:solidFill>
+                </a:uFill>
+                <a:latin typeface="Arial"/>
+              </a:rPr>
+              <a:t>“</a:t>
+            </a:r>
+            <a:r>
+              <a:rPr b="0" lang="en-US" sz="1000" spc="-1" strike="noStrike">
+                <a:solidFill>
+                  <a:srgbClr val="000000"/>
+                </a:solidFill>
+                <a:uFill>
+                  <a:solidFill>
+                    <a:srgbClr val="ffffff"/>
+                  </a:solidFill>
+                </a:uFill>
+                <a:latin typeface="Arial"/>
+              </a:rPr>
+              <a:t>gas” cost = 90 x cost to build and run the “engine” </a:t>
+            </a:r>
+            <a:endParaRPr b="0" lang="en-US" sz="1000" spc="-1" strike="noStrike">
+              <a:solidFill>
+                <a:srgbClr val="000000"/>
+              </a:solidFill>
+              <a:uFill>
+                <a:solidFill>
+                  <a:srgbClr val="ffffff"/>
+                </a:solidFill>
+              </a:uFill>
+              <a:latin typeface="Arial"/>
+            </a:endParaRPr>
           </a:p>
         </p:txBody>
       </p:sp>

</xml_diff>